<commit_message>
Adicionando placas e slide com placas.
</commit_message>
<xml_diff>
--- a/progBasica/meusSlides.pptx
+++ b/progBasica/meusSlides.pptx
@@ -3769,6 +3769,36 @@
           <a:xfrm>
             <a:off x="-3138419" y="-1418450"/>
             <a:ext cx="7648437" cy="3548875"/>
+          </a:xfrm>
+          <a:prstGeom prst="rect">
+            <a:avLst/>
+          </a:prstGeom>
+        </p:spPr>
+      </p:pic>
+      <p:pic>
+        <p:nvPicPr>
+          <p:cNvPr id="5" name="Picture 4" descr="Arduino_DAY2018_Logotype.png"/>
+          <p:cNvPicPr>
+            <a:picLocks noChangeAspect="1"/>
+          </p:cNvPicPr>
+          <p:nvPr/>
+        </p:nvPicPr>
+        <p:blipFill rotWithShape="1">
+          <a:blip r:embed="rId3">
+            <a:alphaModFix/>
+            <a:extLst>
+              <a:ext uri="{28A0092B-C50C-407E-A947-70E740481C1C}">
+                <a14:useLocalDpi xmlns:a14="http://schemas.microsoft.com/office/drawing/2010/main" val="0"/>
+              </a:ext>
+            </a:extLst>
+          </a:blip>
+          <a:srcRect t="6244" r="57012" b="50000"/>
+          <a:stretch/>
+        </p:blipFill>
+        <p:spPr>
+          <a:xfrm>
+            <a:off x="5856057" y="5305152"/>
+            <a:ext cx="3287943" cy="1552848"/>
           </a:xfrm>
           <a:prstGeom prst="rect">
             <a:avLst/>

</xml_diff>

<commit_message>
Incluindo slides e circuitos.
</commit_message>
<xml_diff>
--- a/progBasica/meusSlides.pptx
+++ b/progBasica/meusSlides.pptx
@@ -5,7 +5,7 @@
     <p:sldMasterId id="2147483648" r:id="rId1"/>
   </p:sldMasterIdLst>
   <p:notesMasterIdLst>
-    <p:notesMasterId r:id="rId13"/>
+    <p:notesMasterId r:id="rId27"/>
   </p:notesMasterIdLst>
   <p:sldIdLst>
     <p:sldId id="256" r:id="rId2"/>
@@ -15,10 +15,24 @@
     <p:sldId id="308" r:id="rId6"/>
     <p:sldId id="307" r:id="rId7"/>
     <p:sldId id="309" r:id="rId8"/>
-    <p:sldId id="310" r:id="rId9"/>
-    <p:sldId id="311" r:id="rId10"/>
-    <p:sldId id="268" r:id="rId11"/>
-    <p:sldId id="275" r:id="rId12"/>
+    <p:sldId id="312" r:id="rId9"/>
+    <p:sldId id="310" r:id="rId10"/>
+    <p:sldId id="313" r:id="rId11"/>
+    <p:sldId id="311" r:id="rId12"/>
+    <p:sldId id="314" r:id="rId13"/>
+    <p:sldId id="316" r:id="rId14"/>
+    <p:sldId id="317" r:id="rId15"/>
+    <p:sldId id="315" r:id="rId16"/>
+    <p:sldId id="318" r:id="rId17"/>
+    <p:sldId id="319" r:id="rId18"/>
+    <p:sldId id="321" r:id="rId19"/>
+    <p:sldId id="322" r:id="rId20"/>
+    <p:sldId id="324" r:id="rId21"/>
+    <p:sldId id="323" r:id="rId22"/>
+    <p:sldId id="325" r:id="rId23"/>
+    <p:sldId id="326" r:id="rId24"/>
+    <p:sldId id="268" r:id="rId25"/>
+    <p:sldId id="275" r:id="rId26"/>
   </p:sldIdLst>
   <p:sldSz cx="9144000" cy="6858000" type="screen4x3"/>
   <p:notesSz cx="6858000" cy="9144000"/>
@@ -3753,11 +3767,11 @@
           <p:nvPr/>
         </p:nvPicPr>
         <p:blipFill>
-          <a:blip r:embed="rId3">
+          <a:blip r:embed="rId3" cstate="email">
             <a:alphaModFix/>
             <a:extLst>
               <a:ext uri="{28A0092B-C50C-407E-A947-70E740481C1C}">
-                <a14:useLocalDpi xmlns:a14="http://schemas.microsoft.com/office/drawing/2010/main" val="0"/>
+                <a14:useLocalDpi xmlns:a14="http://schemas.microsoft.com/office/drawing/2010/main"/>
               </a:ext>
             </a:extLst>
           </a:blip>
@@ -3784,15 +3798,15 @@
           <p:nvPr/>
         </p:nvPicPr>
         <p:blipFill rotWithShape="1">
-          <a:blip r:embed="rId3">
+          <a:blip r:embed="rId4" cstate="email">
             <a:alphaModFix/>
             <a:extLst>
               <a:ext uri="{28A0092B-C50C-407E-A947-70E740481C1C}">
-                <a14:useLocalDpi xmlns:a14="http://schemas.microsoft.com/office/drawing/2010/main" val="0"/>
+                <a14:useLocalDpi xmlns:a14="http://schemas.microsoft.com/office/drawing/2010/main"/>
               </a:ext>
             </a:extLst>
           </a:blip>
-          <a:srcRect t="6244" r="57012" b="50000"/>
+          <a:srcRect/>
           <a:stretch/>
         </p:blipFill>
         <p:spPr>
@@ -3874,7 +3888,14 @@
                 <a:latin typeface="Andale Mono"/>
                 <a:cs typeface="Andale Mono"/>
               </a:rPr>
-              <a:t>Referências</a:t>
+              <a:t>Botão</a:t>
+            </a:r>
+            <a:r>
+              <a:rPr lang="en-US" dirty="0" smtClean="0">
+                <a:latin typeface="Andale Mono"/>
+                <a:cs typeface="Andale Mono"/>
+              </a:rPr>
+              <a:t> e LED</a:t>
             </a:r>
             <a:endParaRPr lang="en-US" dirty="0">
               <a:latin typeface="Andale Mono"/>
@@ -3883,83 +3904,44 @@
           </a:p>
         </p:txBody>
       </p:sp>
-      <p:sp>
-        <p:nvSpPr>
-          <p:cNvPr id="3" name="Content Placeholder 2"/>
-          <p:cNvSpPr>
-            <a:spLocks noGrp="1"/>
-          </p:cNvSpPr>
-          <p:nvPr>
-            <p:ph idx="1"/>
-          </p:nvPr>
-        </p:nvSpPr>
+      <p:pic>
+        <p:nvPicPr>
+          <p:cNvPr id="4" name="Picture 3"/>
+          <p:cNvPicPr>
+            <a:picLocks noChangeAspect="1"/>
+          </p:cNvPicPr>
+          <p:nvPr/>
+        </p:nvPicPr>
+        <p:blipFill>
+          <a:blip r:embed="rId2"/>
+          <a:stretch>
+            <a:fillRect/>
+          </a:stretch>
+        </p:blipFill>
         <p:spPr>
           <a:xfrm>
-            <a:off x="457200" y="1252481"/>
-            <a:ext cx="8229600" cy="5047233"/>
+            <a:off x="1847521" y="2273300"/>
+            <a:ext cx="5448958" cy="3128424"/>
           </a:xfrm>
+          <a:prstGeom prst="rect">
+            <a:avLst/>
+          </a:prstGeom>
+          <a:ln>
+            <a:noFill/>
+          </a:ln>
+          <a:effectLst>
+            <a:outerShdw blurRad="292100" dist="139700" dir="2700000" algn="tl" rotWithShape="0">
+              <a:srgbClr val="333333">
+                <a:alpha val="65000"/>
+              </a:srgbClr>
+            </a:outerShdw>
+          </a:effectLst>
         </p:spPr>
-        <p:txBody>
-          <a:bodyPr>
-            <a:normAutofit/>
-          </a:bodyPr>
-          <a:lstStyle/>
-          <a:p>
-            <a:r>
-              <a:rPr lang="en-US" sz="2200" dirty="0">
-                <a:latin typeface="Andale Mono"/>
-                <a:cs typeface="Andale Mono"/>
-                <a:hlinkClick r:id="rId2"/>
-              </a:rPr>
-              <a:t>https://</a:t>
-            </a:r>
-            <a:r>
-              <a:rPr lang="en-US" sz="2200" dirty="0" smtClean="0">
-                <a:latin typeface="Andale Mono"/>
-                <a:cs typeface="Andale Mono"/>
-                <a:hlinkClick r:id="rId2"/>
-              </a:rPr>
-              <a:t>www.arduino.cc</a:t>
-            </a:r>
-            <a:endParaRPr lang="en-US" sz="2200" dirty="0" smtClean="0">
-              <a:latin typeface="Andale Mono"/>
-              <a:cs typeface="Andale Mono"/>
-            </a:endParaRPr>
-          </a:p>
-          <a:p>
-            <a:r>
-              <a:rPr lang="en-US" sz="2200" dirty="0">
-                <a:latin typeface="Andale Mono"/>
-                <a:cs typeface="Andale Mono"/>
-                <a:hlinkClick r:id="rId3"/>
-              </a:rPr>
-              <a:t>https://</a:t>
-            </a:r>
-            <a:r>
-              <a:rPr lang="en-US" sz="2200" dirty="0" smtClean="0">
-                <a:latin typeface="Andale Mono"/>
-                <a:cs typeface="Andale Mono"/>
-                <a:hlinkClick r:id="rId3"/>
-              </a:rPr>
-              <a:t>www.tinkercad.com</a:t>
-            </a:r>
-            <a:endParaRPr lang="en-US" sz="2200" dirty="0" smtClean="0">
-              <a:latin typeface="Andale Mono"/>
-              <a:cs typeface="Andale Mono"/>
-            </a:endParaRPr>
-          </a:p>
-          <a:p>
-            <a:endParaRPr lang="en-US" sz="2200" dirty="0" smtClean="0">
-              <a:latin typeface="Andale Mono"/>
-              <a:cs typeface="Andale Mono"/>
-            </a:endParaRPr>
-          </a:p>
-        </p:txBody>
-      </p:sp>
+      </p:pic>
     </p:spTree>
     <p:extLst>
       <p:ext uri="{BB962C8B-B14F-4D97-AF65-F5344CB8AC3E}">
-        <p14:creationId xmlns:p14="http://schemas.microsoft.com/office/powerpoint/2010/main" val="2102470656"/>
+        <p14:creationId xmlns:p14="http://schemas.microsoft.com/office/powerpoint/2010/main" val="4284810974"/>
       </p:ext>
     </p:extLst>
   </p:cSld>
@@ -4007,75 +3989,67 @@
       </p:grpSpPr>
       <p:sp>
         <p:nvSpPr>
-          <p:cNvPr id="2" name="Rectangle 1"/>
-          <p:cNvSpPr/>
-          <p:nvPr/>
-        </p:nvSpPr>
-        <p:spPr>
-          <a:xfrm>
-            <a:off x="1524531" y="915609"/>
-            <a:ext cx="6094938" cy="1077218"/>
-          </a:xfrm>
-          <a:prstGeom prst="rect">
-            <a:avLst/>
-          </a:prstGeom>
-        </p:spPr>
-        <p:txBody>
-          <a:bodyPr wrap="none">
-            <a:spAutoFit/>
-          </a:bodyPr>
+          <p:cNvPr id="2" name="Title 1"/>
+          <p:cNvSpPr>
+            <a:spLocks noGrp="1"/>
+          </p:cNvSpPr>
+          <p:nvPr>
+            <p:ph type="title"/>
+          </p:nvPr>
+        </p:nvSpPr>
+        <p:spPr/>
+        <p:txBody>
+          <a:bodyPr/>
           <a:lstStyle/>
           <a:p>
             <a:r>
-              <a:rPr lang="en-US" sz="3200" dirty="0" smtClean="0">
-                <a:latin typeface="Andale Mono"/>
-                <a:cs typeface="Andale Mono"/>
-                <a:hlinkClick r:id="rId2"/>
-              </a:rPr>
-              <a:t>github.com</a:t>
-            </a:r>
-            <a:r>
-              <a:rPr lang="en-US" sz="3200" dirty="0">
-                <a:latin typeface="Andale Mono"/>
-                <a:cs typeface="Andale Mono"/>
-                <a:hlinkClick r:id="rId2"/>
-              </a:rPr>
-              <a:t>/fkuhne/</a:t>
-            </a:r>
-            <a:r>
-              <a:rPr lang="en-US" sz="3200" dirty="0" smtClean="0">
-                <a:latin typeface="Andale Mono"/>
-                <a:cs typeface="Andale Mono"/>
-                <a:hlinkClick r:id="rId2"/>
-              </a:rPr>
-              <a:t>aday18</a:t>
-            </a:r>
-            <a:endParaRPr lang="en-US" sz="3200" dirty="0" smtClean="0">
+              <a:rPr lang="en-US" dirty="0" err="1" smtClean="0">
+                <a:latin typeface="Andale Mono"/>
+                <a:cs typeface="Andale Mono"/>
+              </a:rPr>
+              <a:t>Entrada</a:t>
+            </a:r>
+            <a:r>
+              <a:rPr lang="en-US" dirty="0" smtClean="0">
+                <a:latin typeface="Andale Mono"/>
+                <a:cs typeface="Andale Mono"/>
+              </a:rPr>
+              <a:t> </a:t>
+            </a:r>
+            <a:r>
+              <a:rPr lang="en-US" dirty="0" err="1" smtClean="0">
+                <a:latin typeface="Andale Mono"/>
+                <a:cs typeface="Andale Mono"/>
+              </a:rPr>
+              <a:t>anal</a:t>
+            </a:r>
+            <a:r>
+              <a:rPr lang="en-US" dirty="0" err="1" smtClean="0">
+                <a:latin typeface="Andale Mono"/>
+                <a:cs typeface="Andale Mono"/>
+              </a:rPr>
+              <a:t>ógica</a:t>
+            </a:r>
+            <a:endParaRPr lang="en-US" dirty="0">
               <a:latin typeface="Andale Mono"/>
               <a:cs typeface="Andale Mono"/>
             </a:endParaRPr>
           </a:p>
-          <a:p>
-            <a:endParaRPr lang="en-US" sz="3200" dirty="0" smtClean="0">
-              <a:latin typeface="Andale Mono"/>
-              <a:cs typeface="Andale Mono"/>
-            </a:endParaRPr>
-          </a:p>
         </p:txBody>
       </p:sp>
       <p:pic>
         <p:nvPicPr>
-          <p:cNvPr id="3" name="Picture 2" descr="qrcode-github.png"/>
+          <p:cNvPr id="5" name="Picture 4" descr="Entrada analógica (1).png"/>
           <p:cNvPicPr>
             <a:picLocks noChangeAspect="1"/>
           </p:cNvPicPr>
           <p:nvPr/>
         </p:nvPicPr>
         <p:blipFill>
-          <a:blip r:embed="rId3">
+          <a:blip r:embed="rId2">
             <a:extLst>
               <a:ext uri="{28A0092B-C50C-407E-A947-70E740481C1C}">
-                <a14:useLocalDpi xmlns:a14="http://schemas.microsoft.com/office/drawing/2010/main"/>
+                <a14:useLocalDpi xmlns:a14="http://schemas.microsoft.com/office/drawing/2010/main" val="0"/>
               </a:ext>
             </a:extLst>
           </a:blip>
@@ -4085,8 +4059,8 @@
         </p:blipFill>
         <p:spPr>
           <a:xfrm>
-            <a:off x="2667000" y="1960846"/>
-            <a:ext cx="3810000" cy="3810000"/>
+            <a:off x="0" y="1806958"/>
+            <a:ext cx="9144000" cy="4462541"/>
           </a:xfrm>
           <a:prstGeom prst="rect">
             <a:avLst/>
@@ -4096,7 +4070,1100 @@
     </p:spTree>
     <p:extLst>
       <p:ext uri="{BB962C8B-B14F-4D97-AF65-F5344CB8AC3E}">
-        <p14:creationId xmlns:p14="http://schemas.microsoft.com/office/powerpoint/2010/main" val="2144527500"/>
+        <p14:creationId xmlns:p14="http://schemas.microsoft.com/office/powerpoint/2010/main" val="3512566270"/>
+      </p:ext>
+    </p:extLst>
+  </p:cSld>
+  <p:clrMapOvr>
+    <a:masterClrMapping/>
+  </p:clrMapOvr>
+  <mc:AlternateContent xmlns:mc="http://schemas.openxmlformats.org/markup-compatibility/2006" xmlns:p14="http://schemas.microsoft.com/office/powerpoint/2010/main">
+    <mc:Choice Requires="p14">
+      <p:transition p14:dur="400">
+        <p:push dir="u"/>
+      </p:transition>
+    </mc:Choice>
+    <mc:Fallback xmlns="">
+      <p:transition xmlns:p14="http://schemas.microsoft.com/office/powerpoint/2010/main">
+        <p:push dir="u"/>
+      </p:transition>
+    </mc:Fallback>
+  </mc:AlternateContent>
+  <p:timing>
+    <p:tnLst>
+      <p:par>
+        <p:cTn xmlns:p14="http://schemas.microsoft.com/office/powerpoint/2010/main" id="1" dur="indefinite" restart="never" nodeType="tmRoot"/>
+      </p:par>
+    </p:tnLst>
+  </p:timing>
+</p:sld>
+</file>
+
+<file path=ppt/slides/slide12.xml><?xml version="1.0" encoding="utf-8"?>
+<p:sld xmlns:a="http://schemas.openxmlformats.org/drawingml/2006/main" xmlns:r="http://schemas.openxmlformats.org/officeDocument/2006/relationships" xmlns:p="http://schemas.openxmlformats.org/presentationml/2006/main">
+  <p:cSld>
+    <p:spTree>
+      <p:nvGrpSpPr>
+        <p:cNvPr id="1" name=""/>
+        <p:cNvGrpSpPr/>
+        <p:nvPr/>
+      </p:nvGrpSpPr>
+      <p:grpSpPr>
+        <a:xfrm>
+          <a:off x="0" y="0"/>
+          <a:ext cx="0" cy="0"/>
+          <a:chOff x="0" y="0"/>
+          <a:chExt cx="0" cy="0"/>
+        </a:xfrm>
+      </p:grpSpPr>
+      <p:sp>
+        <p:nvSpPr>
+          <p:cNvPr id="2" name="Title 1"/>
+          <p:cNvSpPr>
+            <a:spLocks noGrp="1"/>
+          </p:cNvSpPr>
+          <p:nvPr>
+            <p:ph type="title"/>
+          </p:nvPr>
+        </p:nvSpPr>
+        <p:spPr/>
+        <p:txBody>
+          <a:bodyPr/>
+          <a:lstStyle/>
+          <a:p>
+            <a:r>
+              <a:rPr lang="en-US" dirty="0" err="1" smtClean="0">
+                <a:latin typeface="Andale Mono"/>
+                <a:cs typeface="Andale Mono"/>
+              </a:rPr>
+              <a:t>Entrada</a:t>
+            </a:r>
+            <a:r>
+              <a:rPr lang="en-US" dirty="0" smtClean="0">
+                <a:latin typeface="Andale Mono"/>
+                <a:cs typeface="Andale Mono"/>
+              </a:rPr>
+              <a:t> </a:t>
+            </a:r>
+            <a:r>
+              <a:rPr lang="en-US" dirty="0" err="1" smtClean="0">
+                <a:latin typeface="Andale Mono"/>
+                <a:cs typeface="Andale Mono"/>
+              </a:rPr>
+              <a:t>anal</a:t>
+            </a:r>
+            <a:r>
+              <a:rPr lang="en-US" dirty="0" err="1" smtClean="0">
+                <a:latin typeface="Andale Mono"/>
+                <a:cs typeface="Andale Mono"/>
+              </a:rPr>
+              <a:t>ógica</a:t>
+            </a:r>
+            <a:endParaRPr lang="en-US" dirty="0">
+              <a:latin typeface="Andale Mono"/>
+              <a:cs typeface="Andale Mono"/>
+            </a:endParaRPr>
+          </a:p>
+        </p:txBody>
+      </p:sp>
+      <p:pic>
+        <p:nvPicPr>
+          <p:cNvPr id="6" name="Picture 5"/>
+          <p:cNvPicPr>
+            <a:picLocks noChangeAspect="1"/>
+          </p:cNvPicPr>
+          <p:nvPr/>
+        </p:nvPicPr>
+        <p:blipFill>
+          <a:blip r:embed="rId2"/>
+          <a:stretch>
+            <a:fillRect/>
+          </a:stretch>
+        </p:blipFill>
+        <p:spPr>
+          <a:xfrm>
+            <a:off x="1291896" y="2507084"/>
+            <a:ext cx="6560208" cy="3245022"/>
+          </a:xfrm>
+          <a:prstGeom prst="rect">
+            <a:avLst/>
+          </a:prstGeom>
+          <a:ln>
+            <a:noFill/>
+          </a:ln>
+          <a:effectLst>
+            <a:outerShdw blurRad="292100" dist="139700" dir="2700000" algn="tl" rotWithShape="0">
+              <a:srgbClr val="333333">
+                <a:alpha val="65000"/>
+              </a:srgbClr>
+            </a:outerShdw>
+          </a:effectLst>
+        </p:spPr>
+      </p:pic>
+    </p:spTree>
+    <p:extLst>
+      <p:ext uri="{BB962C8B-B14F-4D97-AF65-F5344CB8AC3E}">
+        <p14:creationId xmlns:p14="http://schemas.microsoft.com/office/powerpoint/2010/main" val="1138272344"/>
+      </p:ext>
+    </p:extLst>
+  </p:cSld>
+  <p:clrMapOvr>
+    <a:masterClrMapping/>
+  </p:clrMapOvr>
+  <mc:AlternateContent xmlns:mc="http://schemas.openxmlformats.org/markup-compatibility/2006" xmlns:p14="http://schemas.microsoft.com/office/powerpoint/2010/main">
+    <mc:Choice Requires="p14">
+      <p:transition p14:dur="400">
+        <p:push dir="u"/>
+      </p:transition>
+    </mc:Choice>
+    <mc:Fallback xmlns="">
+      <p:transition xmlns:p14="http://schemas.microsoft.com/office/powerpoint/2010/main">
+        <p:push dir="u"/>
+      </p:transition>
+    </mc:Fallback>
+  </mc:AlternateContent>
+  <p:timing>
+    <p:tnLst>
+      <p:par>
+        <p:cTn xmlns:p14="http://schemas.microsoft.com/office/powerpoint/2010/main" id="1" dur="indefinite" restart="never" nodeType="tmRoot"/>
+      </p:par>
+    </p:tnLst>
+  </p:timing>
+</p:sld>
+</file>
+
+<file path=ppt/slides/slide13.xml><?xml version="1.0" encoding="utf-8"?>
+<p:sld xmlns:a="http://schemas.openxmlformats.org/drawingml/2006/main" xmlns:r="http://schemas.openxmlformats.org/officeDocument/2006/relationships" xmlns:p="http://schemas.openxmlformats.org/presentationml/2006/main" show="0">
+  <p:cSld>
+    <p:spTree>
+      <p:nvGrpSpPr>
+        <p:cNvPr id="1" name=""/>
+        <p:cNvGrpSpPr/>
+        <p:nvPr/>
+      </p:nvGrpSpPr>
+      <p:grpSpPr>
+        <a:xfrm>
+          <a:off x="0" y="0"/>
+          <a:ext cx="0" cy="0"/>
+          <a:chOff x="0" y="0"/>
+          <a:chExt cx="0" cy="0"/>
+        </a:xfrm>
+      </p:grpSpPr>
+      <p:sp>
+        <p:nvSpPr>
+          <p:cNvPr id="2" name="Title 1"/>
+          <p:cNvSpPr>
+            <a:spLocks noGrp="1"/>
+          </p:cNvSpPr>
+          <p:nvPr>
+            <p:ph type="title"/>
+          </p:nvPr>
+        </p:nvSpPr>
+        <p:spPr/>
+        <p:txBody>
+          <a:bodyPr/>
+          <a:lstStyle/>
+          <a:p>
+            <a:r>
+              <a:rPr lang="en-US" dirty="0" err="1" smtClean="0">
+                <a:latin typeface="Andale Mono"/>
+                <a:cs typeface="Andale Mono"/>
+              </a:rPr>
+              <a:t>Sa</a:t>
+            </a:r>
+            <a:r>
+              <a:rPr lang="en-US" dirty="0" err="1" smtClean="0">
+                <a:latin typeface="Andale Mono"/>
+                <a:cs typeface="Andale Mono"/>
+              </a:rPr>
+              <a:t>ída</a:t>
+            </a:r>
+            <a:r>
+              <a:rPr lang="en-US" dirty="0" smtClean="0">
+                <a:latin typeface="Andale Mono"/>
+                <a:cs typeface="Andale Mono"/>
+              </a:rPr>
+              <a:t> </a:t>
+            </a:r>
+            <a:r>
+              <a:rPr lang="en-US" dirty="0" err="1" smtClean="0">
+                <a:latin typeface="Andale Mono"/>
+                <a:cs typeface="Andale Mono"/>
+              </a:rPr>
+              <a:t>anal</a:t>
+            </a:r>
+            <a:r>
+              <a:rPr lang="en-US" dirty="0" err="1" smtClean="0">
+                <a:latin typeface="Andale Mono"/>
+                <a:cs typeface="Andale Mono"/>
+              </a:rPr>
+              <a:t>ógica</a:t>
+            </a:r>
+            <a:endParaRPr lang="en-US" dirty="0">
+              <a:latin typeface="Andale Mono"/>
+              <a:cs typeface="Andale Mono"/>
+            </a:endParaRPr>
+          </a:p>
+        </p:txBody>
+      </p:sp>
+      <p:pic>
+        <p:nvPicPr>
+          <p:cNvPr id="3" name="Picture 2" descr="Blink Analógico.png"/>
+          <p:cNvPicPr>
+            <a:picLocks noChangeAspect="1"/>
+          </p:cNvPicPr>
+          <p:nvPr/>
+        </p:nvPicPr>
+        <p:blipFill>
+          <a:blip r:embed="rId2">
+            <a:extLst>
+              <a:ext uri="{28A0092B-C50C-407E-A947-70E740481C1C}">
+                <a14:useLocalDpi xmlns:a14="http://schemas.microsoft.com/office/drawing/2010/main" val="0"/>
+              </a:ext>
+            </a:extLst>
+          </a:blip>
+          <a:stretch>
+            <a:fillRect/>
+          </a:stretch>
+        </p:blipFill>
+        <p:spPr>
+          <a:xfrm>
+            <a:off x="0" y="1441270"/>
+            <a:ext cx="9144000" cy="4841436"/>
+          </a:xfrm>
+          <a:prstGeom prst="rect">
+            <a:avLst/>
+          </a:prstGeom>
+        </p:spPr>
+      </p:pic>
+    </p:spTree>
+    <p:extLst>
+      <p:ext uri="{BB962C8B-B14F-4D97-AF65-F5344CB8AC3E}">
+        <p14:creationId xmlns:p14="http://schemas.microsoft.com/office/powerpoint/2010/main" val="385331617"/>
+      </p:ext>
+    </p:extLst>
+  </p:cSld>
+  <p:clrMapOvr>
+    <a:masterClrMapping/>
+  </p:clrMapOvr>
+  <mc:AlternateContent xmlns:mc="http://schemas.openxmlformats.org/markup-compatibility/2006">
+    <mc:Choice xmlns:p14="http://schemas.microsoft.com/office/powerpoint/2010/main" Requires="p14">
+      <p:transition p14:dur="400">
+        <p:push dir="u"/>
+      </p:transition>
+    </mc:Choice>
+    <mc:Fallback>
+      <p:transition xmlns:p14="http://schemas.microsoft.com/office/powerpoint/2010/main">
+        <p:push dir="u"/>
+      </p:transition>
+    </mc:Fallback>
+  </mc:AlternateContent>
+  <p:timing>
+    <p:tnLst>
+      <p:par>
+        <p:cTn xmlns:p14="http://schemas.microsoft.com/office/powerpoint/2010/main" id="1" dur="indefinite" restart="never" nodeType="tmRoot"/>
+      </p:par>
+    </p:tnLst>
+  </p:timing>
+</p:sld>
+</file>
+
+<file path=ppt/slides/slide14.xml><?xml version="1.0" encoding="utf-8"?>
+<p:sld xmlns:a="http://schemas.openxmlformats.org/drawingml/2006/main" xmlns:r="http://schemas.openxmlformats.org/officeDocument/2006/relationships" xmlns:p="http://schemas.openxmlformats.org/presentationml/2006/main" show="0">
+  <p:cSld>
+    <p:spTree>
+      <p:nvGrpSpPr>
+        <p:cNvPr id="1" name=""/>
+        <p:cNvGrpSpPr/>
+        <p:nvPr/>
+      </p:nvGrpSpPr>
+      <p:grpSpPr>
+        <a:xfrm>
+          <a:off x="0" y="0"/>
+          <a:ext cx="0" cy="0"/>
+          <a:chOff x="0" y="0"/>
+          <a:chExt cx="0" cy="0"/>
+        </a:xfrm>
+      </p:grpSpPr>
+      <p:sp>
+        <p:nvSpPr>
+          <p:cNvPr id="2" name="Title 1"/>
+          <p:cNvSpPr>
+            <a:spLocks noGrp="1"/>
+          </p:cNvSpPr>
+          <p:nvPr>
+            <p:ph type="title"/>
+          </p:nvPr>
+        </p:nvSpPr>
+        <p:spPr/>
+        <p:txBody>
+          <a:bodyPr/>
+          <a:lstStyle/>
+          <a:p>
+            <a:r>
+              <a:rPr lang="en-US" dirty="0" err="1" smtClean="0">
+                <a:latin typeface="Andale Mono"/>
+                <a:cs typeface="Andale Mono"/>
+              </a:rPr>
+              <a:t>Sa</a:t>
+            </a:r>
+            <a:r>
+              <a:rPr lang="en-US" dirty="0" err="1" smtClean="0">
+                <a:latin typeface="Andale Mono"/>
+                <a:cs typeface="Andale Mono"/>
+              </a:rPr>
+              <a:t>ída</a:t>
+            </a:r>
+            <a:r>
+              <a:rPr lang="en-US" dirty="0" smtClean="0">
+                <a:latin typeface="Andale Mono"/>
+                <a:cs typeface="Andale Mono"/>
+              </a:rPr>
+              <a:t> </a:t>
+            </a:r>
+            <a:r>
+              <a:rPr lang="en-US" dirty="0" err="1" smtClean="0">
+                <a:latin typeface="Andale Mono"/>
+                <a:cs typeface="Andale Mono"/>
+              </a:rPr>
+              <a:t>anal</a:t>
+            </a:r>
+            <a:r>
+              <a:rPr lang="en-US" dirty="0" err="1" smtClean="0">
+                <a:latin typeface="Andale Mono"/>
+                <a:cs typeface="Andale Mono"/>
+              </a:rPr>
+              <a:t>ógica</a:t>
+            </a:r>
+            <a:endParaRPr lang="en-US" dirty="0">
+              <a:latin typeface="Andale Mono"/>
+              <a:cs typeface="Andale Mono"/>
+            </a:endParaRPr>
+          </a:p>
+        </p:txBody>
+      </p:sp>
+      <p:pic>
+        <p:nvPicPr>
+          <p:cNvPr id="4" name="Picture 3"/>
+          <p:cNvPicPr>
+            <a:picLocks noChangeAspect="1"/>
+          </p:cNvPicPr>
+          <p:nvPr/>
+        </p:nvPicPr>
+        <p:blipFill>
+          <a:blip r:embed="rId2"/>
+          <a:stretch>
+            <a:fillRect/>
+          </a:stretch>
+        </p:blipFill>
+        <p:spPr>
+          <a:xfrm>
+            <a:off x="1620314" y="1417638"/>
+            <a:ext cx="5903372" cy="5440362"/>
+          </a:xfrm>
+          <a:prstGeom prst="rect">
+            <a:avLst/>
+          </a:prstGeom>
+          <a:ln>
+            <a:noFill/>
+          </a:ln>
+          <a:effectLst>
+            <a:outerShdw blurRad="292100" dist="139700" dir="2700000" algn="tl" rotWithShape="0">
+              <a:srgbClr val="333333">
+                <a:alpha val="65000"/>
+              </a:srgbClr>
+            </a:outerShdw>
+          </a:effectLst>
+        </p:spPr>
+      </p:pic>
+    </p:spTree>
+    <p:extLst>
+      <p:ext uri="{BB962C8B-B14F-4D97-AF65-F5344CB8AC3E}">
+        <p14:creationId xmlns:p14="http://schemas.microsoft.com/office/powerpoint/2010/main" val="304379338"/>
+      </p:ext>
+    </p:extLst>
+  </p:cSld>
+  <p:clrMapOvr>
+    <a:masterClrMapping/>
+  </p:clrMapOvr>
+  <mc:AlternateContent xmlns:mc="http://schemas.openxmlformats.org/markup-compatibility/2006">
+    <mc:Choice xmlns:p14="http://schemas.microsoft.com/office/powerpoint/2010/main" Requires="p14">
+      <p:transition p14:dur="400">
+        <p:push dir="u"/>
+      </p:transition>
+    </mc:Choice>
+    <mc:Fallback>
+      <p:transition xmlns:p14="http://schemas.microsoft.com/office/powerpoint/2010/main">
+        <p:push dir="u"/>
+      </p:transition>
+    </mc:Fallback>
+  </mc:AlternateContent>
+  <p:timing>
+    <p:tnLst>
+      <p:par>
+        <p:cTn xmlns:p14="http://schemas.microsoft.com/office/powerpoint/2010/main" id="1" dur="indefinite" restart="never" nodeType="tmRoot"/>
+      </p:par>
+    </p:tnLst>
+  </p:timing>
+</p:sld>
+</file>
+
+<file path=ppt/slides/slide15.xml><?xml version="1.0" encoding="utf-8"?>
+<p:sld xmlns:a="http://schemas.openxmlformats.org/drawingml/2006/main" xmlns:r="http://schemas.openxmlformats.org/officeDocument/2006/relationships" xmlns:p="http://schemas.openxmlformats.org/presentationml/2006/main">
+  <p:cSld>
+    <p:spTree>
+      <p:nvGrpSpPr>
+        <p:cNvPr id="1" name=""/>
+        <p:cNvGrpSpPr/>
+        <p:nvPr/>
+      </p:nvGrpSpPr>
+      <p:grpSpPr>
+        <a:xfrm>
+          <a:off x="0" y="0"/>
+          <a:ext cx="0" cy="0"/>
+          <a:chOff x="0" y="0"/>
+          <a:chExt cx="0" cy="0"/>
+        </a:xfrm>
+      </p:grpSpPr>
+      <p:sp>
+        <p:nvSpPr>
+          <p:cNvPr id="2" name="Title 1"/>
+          <p:cNvSpPr>
+            <a:spLocks noGrp="1"/>
+          </p:cNvSpPr>
+          <p:nvPr>
+            <p:ph type="title"/>
+          </p:nvPr>
+        </p:nvSpPr>
+        <p:spPr/>
+        <p:txBody>
+          <a:bodyPr>
+            <a:normAutofit fontScale="90000"/>
+          </a:bodyPr>
+          <a:lstStyle/>
+          <a:p>
+            <a:r>
+              <a:rPr lang="en-US" dirty="0" err="1" smtClean="0">
+                <a:latin typeface="Andale Mono"/>
+                <a:cs typeface="Andale Mono"/>
+              </a:rPr>
+              <a:t>Entrada</a:t>
+            </a:r>
+            <a:r>
+              <a:rPr lang="en-US" dirty="0" smtClean="0">
+                <a:latin typeface="Andale Mono"/>
+                <a:cs typeface="Andale Mono"/>
+              </a:rPr>
+              <a:t> e </a:t>
+            </a:r>
+            <a:r>
+              <a:rPr lang="en-US" dirty="0" err="1" smtClean="0">
+                <a:latin typeface="Andale Mono"/>
+                <a:cs typeface="Andale Mono"/>
+              </a:rPr>
+              <a:t>sa</a:t>
+            </a:r>
+            <a:r>
+              <a:rPr lang="en-US" dirty="0" err="1" smtClean="0">
+                <a:latin typeface="Andale Mono"/>
+                <a:cs typeface="Andale Mono"/>
+              </a:rPr>
+              <a:t>ída</a:t>
+            </a:r>
+            <a:r>
+              <a:rPr lang="en-US" dirty="0" smtClean="0">
+                <a:latin typeface="Andale Mono"/>
+                <a:cs typeface="Andale Mono"/>
+              </a:rPr>
+              <a:t> </a:t>
+            </a:r>
+            <a:r>
+              <a:rPr lang="en-US" dirty="0" err="1" smtClean="0">
+                <a:latin typeface="Andale Mono"/>
+                <a:cs typeface="Andale Mono"/>
+              </a:rPr>
+              <a:t>anal</a:t>
+            </a:r>
+            <a:r>
+              <a:rPr lang="en-US" dirty="0" err="1" smtClean="0">
+                <a:latin typeface="Andale Mono"/>
+                <a:cs typeface="Andale Mono"/>
+              </a:rPr>
+              <a:t>ógicas</a:t>
+            </a:r>
+            <a:endParaRPr lang="en-US" dirty="0">
+              <a:latin typeface="Andale Mono"/>
+              <a:cs typeface="Andale Mono"/>
+            </a:endParaRPr>
+          </a:p>
+        </p:txBody>
+      </p:sp>
+      <p:pic>
+        <p:nvPicPr>
+          <p:cNvPr id="3" name="Picture 2" descr="Entrada e saída analógicas.png"/>
+          <p:cNvPicPr>
+            <a:picLocks noChangeAspect="1"/>
+          </p:cNvPicPr>
+          <p:nvPr/>
+        </p:nvPicPr>
+        <p:blipFill>
+          <a:blip r:embed="rId2">
+            <a:extLst>
+              <a:ext uri="{28A0092B-C50C-407E-A947-70E740481C1C}">
+                <a14:useLocalDpi xmlns:a14="http://schemas.microsoft.com/office/drawing/2010/main" val="0"/>
+              </a:ext>
+            </a:extLst>
+          </a:blip>
+          <a:stretch>
+            <a:fillRect/>
+          </a:stretch>
+        </p:blipFill>
+        <p:spPr>
+          <a:xfrm>
+            <a:off x="0" y="1441270"/>
+            <a:ext cx="9144000" cy="4841436"/>
+          </a:xfrm>
+          <a:prstGeom prst="rect">
+            <a:avLst/>
+          </a:prstGeom>
+        </p:spPr>
+      </p:pic>
+    </p:spTree>
+    <p:extLst>
+      <p:ext uri="{BB962C8B-B14F-4D97-AF65-F5344CB8AC3E}">
+        <p14:creationId xmlns:p14="http://schemas.microsoft.com/office/powerpoint/2010/main" val="1340007585"/>
+      </p:ext>
+    </p:extLst>
+  </p:cSld>
+  <p:clrMapOvr>
+    <a:masterClrMapping/>
+  </p:clrMapOvr>
+  <mc:AlternateContent xmlns:mc="http://schemas.openxmlformats.org/markup-compatibility/2006" xmlns:p14="http://schemas.microsoft.com/office/powerpoint/2010/main">
+    <mc:Choice Requires="p14">
+      <p:transition p14:dur="400">
+        <p:push dir="u"/>
+      </p:transition>
+    </mc:Choice>
+    <mc:Fallback xmlns="">
+      <p:transition xmlns:p14="http://schemas.microsoft.com/office/powerpoint/2010/main">
+        <p:push dir="u"/>
+      </p:transition>
+    </mc:Fallback>
+  </mc:AlternateContent>
+  <p:timing>
+    <p:tnLst>
+      <p:par>
+        <p:cTn xmlns:p14="http://schemas.microsoft.com/office/powerpoint/2010/main" id="1" dur="indefinite" restart="never" nodeType="tmRoot"/>
+      </p:par>
+    </p:tnLst>
+  </p:timing>
+</p:sld>
+</file>
+
+<file path=ppt/slides/slide16.xml><?xml version="1.0" encoding="utf-8"?>
+<p:sld xmlns:a="http://schemas.openxmlformats.org/drawingml/2006/main" xmlns:r="http://schemas.openxmlformats.org/officeDocument/2006/relationships" xmlns:p="http://schemas.openxmlformats.org/presentationml/2006/main">
+  <p:cSld>
+    <p:spTree>
+      <p:nvGrpSpPr>
+        <p:cNvPr id="1" name=""/>
+        <p:cNvGrpSpPr/>
+        <p:nvPr/>
+      </p:nvGrpSpPr>
+      <p:grpSpPr>
+        <a:xfrm>
+          <a:off x="0" y="0"/>
+          <a:ext cx="0" cy="0"/>
+          <a:chOff x="0" y="0"/>
+          <a:chExt cx="0" cy="0"/>
+        </a:xfrm>
+      </p:grpSpPr>
+      <p:sp>
+        <p:nvSpPr>
+          <p:cNvPr id="2" name="Title 1"/>
+          <p:cNvSpPr>
+            <a:spLocks noGrp="1"/>
+          </p:cNvSpPr>
+          <p:nvPr>
+            <p:ph type="title"/>
+          </p:nvPr>
+        </p:nvSpPr>
+        <p:spPr/>
+        <p:txBody>
+          <a:bodyPr>
+            <a:normAutofit fontScale="90000"/>
+          </a:bodyPr>
+          <a:lstStyle/>
+          <a:p>
+            <a:r>
+              <a:rPr lang="en-US" dirty="0" err="1" smtClean="0">
+                <a:latin typeface="Andale Mono"/>
+                <a:cs typeface="Andale Mono"/>
+              </a:rPr>
+              <a:t>Entrada</a:t>
+            </a:r>
+            <a:r>
+              <a:rPr lang="en-US" dirty="0" smtClean="0">
+                <a:latin typeface="Andale Mono"/>
+                <a:cs typeface="Andale Mono"/>
+              </a:rPr>
+              <a:t> e </a:t>
+            </a:r>
+            <a:r>
+              <a:rPr lang="en-US" dirty="0" err="1" smtClean="0">
+                <a:latin typeface="Andale Mono"/>
+                <a:cs typeface="Andale Mono"/>
+              </a:rPr>
+              <a:t>sa</a:t>
+            </a:r>
+            <a:r>
+              <a:rPr lang="en-US" dirty="0" err="1" smtClean="0">
+                <a:latin typeface="Andale Mono"/>
+                <a:cs typeface="Andale Mono"/>
+              </a:rPr>
+              <a:t>ída</a:t>
+            </a:r>
+            <a:r>
+              <a:rPr lang="en-US" dirty="0" smtClean="0">
+                <a:latin typeface="Andale Mono"/>
+                <a:cs typeface="Andale Mono"/>
+              </a:rPr>
+              <a:t> </a:t>
+            </a:r>
+            <a:r>
+              <a:rPr lang="en-US" dirty="0" err="1" smtClean="0">
+                <a:latin typeface="Andale Mono"/>
+                <a:cs typeface="Andale Mono"/>
+              </a:rPr>
+              <a:t>anal</a:t>
+            </a:r>
+            <a:r>
+              <a:rPr lang="en-US" dirty="0" err="1" smtClean="0">
+                <a:latin typeface="Andale Mono"/>
+                <a:cs typeface="Andale Mono"/>
+              </a:rPr>
+              <a:t>ógicas</a:t>
+            </a:r>
+            <a:endParaRPr lang="en-US" dirty="0">
+              <a:latin typeface="Andale Mono"/>
+              <a:cs typeface="Andale Mono"/>
+            </a:endParaRPr>
+          </a:p>
+        </p:txBody>
+      </p:sp>
+      <p:pic>
+        <p:nvPicPr>
+          <p:cNvPr id="4" name="Picture 3"/>
+          <p:cNvPicPr>
+            <a:picLocks noChangeAspect="1"/>
+          </p:cNvPicPr>
+          <p:nvPr/>
+        </p:nvPicPr>
+        <p:blipFill>
+          <a:blip r:embed="rId2"/>
+          <a:stretch>
+            <a:fillRect/>
+          </a:stretch>
+        </p:blipFill>
+        <p:spPr>
+          <a:xfrm>
+            <a:off x="432704" y="2213535"/>
+            <a:ext cx="8278592" cy="3538818"/>
+          </a:xfrm>
+          <a:prstGeom prst="rect">
+            <a:avLst/>
+          </a:prstGeom>
+          <a:ln>
+            <a:noFill/>
+          </a:ln>
+          <a:effectLst>
+            <a:outerShdw blurRad="292100" dist="139700" dir="2700000" algn="tl" rotWithShape="0">
+              <a:srgbClr val="333333">
+                <a:alpha val="65000"/>
+              </a:srgbClr>
+            </a:outerShdw>
+          </a:effectLst>
+        </p:spPr>
+      </p:pic>
+    </p:spTree>
+    <p:extLst>
+      <p:ext uri="{BB962C8B-B14F-4D97-AF65-F5344CB8AC3E}">
+        <p14:creationId xmlns:p14="http://schemas.microsoft.com/office/powerpoint/2010/main" val="2917881908"/>
+      </p:ext>
+    </p:extLst>
+  </p:cSld>
+  <p:clrMapOvr>
+    <a:masterClrMapping/>
+  </p:clrMapOvr>
+  <mc:AlternateContent xmlns:mc="http://schemas.openxmlformats.org/markup-compatibility/2006" xmlns:p14="http://schemas.microsoft.com/office/powerpoint/2010/main">
+    <mc:Choice Requires="p14">
+      <p:transition p14:dur="400">
+        <p:push dir="u"/>
+      </p:transition>
+    </mc:Choice>
+    <mc:Fallback xmlns="">
+      <p:transition xmlns:p14="http://schemas.microsoft.com/office/powerpoint/2010/main">
+        <p:push dir="u"/>
+      </p:transition>
+    </mc:Fallback>
+  </mc:AlternateContent>
+  <p:timing>
+    <p:tnLst>
+      <p:par>
+        <p:cTn xmlns:p14="http://schemas.microsoft.com/office/powerpoint/2010/main" id="1" dur="indefinite" restart="never" nodeType="tmRoot"/>
+      </p:par>
+    </p:tnLst>
+  </p:timing>
+</p:sld>
+</file>
+
+<file path=ppt/slides/slide17.xml><?xml version="1.0" encoding="utf-8"?>
+<p:sld xmlns:a="http://schemas.openxmlformats.org/drawingml/2006/main" xmlns:r="http://schemas.openxmlformats.org/officeDocument/2006/relationships" xmlns:p="http://schemas.openxmlformats.org/presentationml/2006/main">
+  <p:cSld>
+    <p:spTree>
+      <p:nvGrpSpPr>
+        <p:cNvPr id="1" name=""/>
+        <p:cNvGrpSpPr/>
+        <p:nvPr/>
+      </p:nvGrpSpPr>
+      <p:grpSpPr>
+        <a:xfrm>
+          <a:off x="0" y="0"/>
+          <a:ext cx="0" cy="0"/>
+          <a:chOff x="0" y="0"/>
+          <a:chExt cx="0" cy="0"/>
+        </a:xfrm>
+      </p:grpSpPr>
+      <p:sp>
+        <p:nvSpPr>
+          <p:cNvPr id="2" name="Title 1"/>
+          <p:cNvSpPr>
+            <a:spLocks noGrp="1"/>
+          </p:cNvSpPr>
+          <p:nvPr>
+            <p:ph type="title"/>
+          </p:nvPr>
+        </p:nvSpPr>
+        <p:spPr/>
+        <p:txBody>
+          <a:bodyPr>
+            <a:normAutofit/>
+          </a:bodyPr>
+          <a:lstStyle/>
+          <a:p>
+            <a:r>
+              <a:rPr lang="en-US" dirty="0" err="1" smtClean="0">
+                <a:latin typeface="Andale Mono"/>
+                <a:cs typeface="Andale Mono"/>
+              </a:rPr>
+              <a:t>Potenci</a:t>
+            </a:r>
+            <a:r>
+              <a:rPr lang="en-US" dirty="0" err="1" smtClean="0">
+                <a:latin typeface="Andale Mono"/>
+                <a:cs typeface="Andale Mono"/>
+              </a:rPr>
+              <a:t>ômetro</a:t>
+            </a:r>
+            <a:r>
+              <a:rPr lang="en-US" dirty="0" smtClean="0">
+                <a:latin typeface="Andale Mono"/>
+                <a:cs typeface="Andale Mono"/>
+              </a:rPr>
+              <a:t> e Servo</a:t>
+            </a:r>
+            <a:endParaRPr lang="en-US" dirty="0">
+              <a:latin typeface="Andale Mono"/>
+              <a:cs typeface="Andale Mono"/>
+            </a:endParaRPr>
+          </a:p>
+        </p:txBody>
+      </p:sp>
+      <p:pic>
+        <p:nvPicPr>
+          <p:cNvPr id="4" name="Picture 3" descr="Copy of Servo motor movido por potenciometro.png"/>
+          <p:cNvPicPr>
+            <a:picLocks noChangeAspect="1"/>
+          </p:cNvPicPr>
+          <p:nvPr/>
+        </p:nvPicPr>
+        <p:blipFill>
+          <a:blip r:embed="rId2">
+            <a:extLst>
+              <a:ext uri="{28A0092B-C50C-407E-A947-70E740481C1C}">
+                <a14:useLocalDpi xmlns:a14="http://schemas.microsoft.com/office/drawing/2010/main" val="0"/>
+              </a:ext>
+            </a:extLst>
+          </a:blip>
+          <a:stretch>
+            <a:fillRect/>
+          </a:stretch>
+        </p:blipFill>
+        <p:spPr>
+          <a:xfrm>
+            <a:off x="0" y="1571058"/>
+            <a:ext cx="9144000" cy="4841436"/>
+          </a:xfrm>
+          <a:prstGeom prst="rect">
+            <a:avLst/>
+          </a:prstGeom>
+        </p:spPr>
+      </p:pic>
+    </p:spTree>
+    <p:extLst>
+      <p:ext uri="{BB962C8B-B14F-4D97-AF65-F5344CB8AC3E}">
+        <p14:creationId xmlns:p14="http://schemas.microsoft.com/office/powerpoint/2010/main" val="410187534"/>
+      </p:ext>
+    </p:extLst>
+  </p:cSld>
+  <p:clrMapOvr>
+    <a:masterClrMapping/>
+  </p:clrMapOvr>
+  <mc:AlternateContent xmlns:mc="http://schemas.openxmlformats.org/markup-compatibility/2006" xmlns:p14="http://schemas.microsoft.com/office/powerpoint/2010/main">
+    <mc:Choice Requires="p14">
+      <p:transition p14:dur="400">
+        <p:push dir="u"/>
+      </p:transition>
+    </mc:Choice>
+    <mc:Fallback xmlns="">
+      <p:transition xmlns:p14="http://schemas.microsoft.com/office/powerpoint/2010/main">
+        <p:push dir="u"/>
+      </p:transition>
+    </mc:Fallback>
+  </mc:AlternateContent>
+  <p:timing>
+    <p:tnLst>
+      <p:par>
+        <p:cTn xmlns:p14="http://schemas.microsoft.com/office/powerpoint/2010/main" id="1" dur="indefinite" restart="never" nodeType="tmRoot"/>
+      </p:par>
+    </p:tnLst>
+  </p:timing>
+</p:sld>
+</file>
+
+<file path=ppt/slides/slide18.xml><?xml version="1.0" encoding="utf-8"?>
+<p:sld xmlns:a="http://schemas.openxmlformats.org/drawingml/2006/main" xmlns:r="http://schemas.openxmlformats.org/officeDocument/2006/relationships" xmlns:p="http://schemas.openxmlformats.org/presentationml/2006/main">
+  <p:cSld>
+    <p:spTree>
+      <p:nvGrpSpPr>
+        <p:cNvPr id="1" name=""/>
+        <p:cNvGrpSpPr/>
+        <p:nvPr/>
+      </p:nvGrpSpPr>
+      <p:grpSpPr>
+        <a:xfrm>
+          <a:off x="0" y="0"/>
+          <a:ext cx="0" cy="0"/>
+          <a:chOff x="0" y="0"/>
+          <a:chExt cx="0" cy="0"/>
+        </a:xfrm>
+      </p:grpSpPr>
+      <p:sp>
+        <p:nvSpPr>
+          <p:cNvPr id="2" name="Title 1"/>
+          <p:cNvSpPr>
+            <a:spLocks noGrp="1"/>
+          </p:cNvSpPr>
+          <p:nvPr>
+            <p:ph type="title"/>
+          </p:nvPr>
+        </p:nvSpPr>
+        <p:spPr/>
+        <p:txBody>
+          <a:bodyPr>
+            <a:normAutofit/>
+          </a:bodyPr>
+          <a:lstStyle/>
+          <a:p>
+            <a:r>
+              <a:rPr lang="en-US" dirty="0" err="1" smtClean="0">
+                <a:latin typeface="Andale Mono"/>
+                <a:cs typeface="Andale Mono"/>
+              </a:rPr>
+              <a:t>Potenci</a:t>
+            </a:r>
+            <a:r>
+              <a:rPr lang="en-US" dirty="0" err="1" smtClean="0">
+                <a:latin typeface="Andale Mono"/>
+                <a:cs typeface="Andale Mono"/>
+              </a:rPr>
+              <a:t>ômetro</a:t>
+            </a:r>
+            <a:r>
+              <a:rPr lang="en-US" dirty="0" smtClean="0">
+                <a:latin typeface="Andale Mono"/>
+                <a:cs typeface="Andale Mono"/>
+              </a:rPr>
+              <a:t> e Servo</a:t>
+            </a:r>
+            <a:endParaRPr lang="en-US" dirty="0">
+              <a:latin typeface="Andale Mono"/>
+              <a:cs typeface="Andale Mono"/>
+            </a:endParaRPr>
+          </a:p>
+        </p:txBody>
+      </p:sp>
+      <p:pic>
+        <p:nvPicPr>
+          <p:cNvPr id="5" name="Picture 4"/>
+          <p:cNvPicPr>
+            <a:picLocks noChangeAspect="1"/>
+          </p:cNvPicPr>
+          <p:nvPr/>
+        </p:nvPicPr>
+        <p:blipFill>
+          <a:blip r:embed="rId2"/>
+          <a:stretch>
+            <a:fillRect/>
+          </a:stretch>
+        </p:blipFill>
+        <p:spPr>
+          <a:xfrm>
+            <a:off x="443683" y="1480668"/>
+            <a:ext cx="8256635" cy="5198035"/>
+          </a:xfrm>
+          <a:prstGeom prst="rect">
+            <a:avLst/>
+          </a:prstGeom>
+          <a:ln>
+            <a:noFill/>
+          </a:ln>
+          <a:effectLst>
+            <a:outerShdw blurRad="292100" dist="139700" dir="2700000" algn="tl" rotWithShape="0">
+              <a:srgbClr val="333333">
+                <a:alpha val="65000"/>
+              </a:srgbClr>
+            </a:outerShdw>
+          </a:effectLst>
+        </p:spPr>
+      </p:pic>
+    </p:spTree>
+    <p:extLst>
+      <p:ext uri="{BB962C8B-B14F-4D97-AF65-F5344CB8AC3E}">
+        <p14:creationId xmlns:p14="http://schemas.microsoft.com/office/powerpoint/2010/main" val="655396978"/>
+      </p:ext>
+    </p:extLst>
+  </p:cSld>
+  <p:clrMapOvr>
+    <a:masterClrMapping/>
+  </p:clrMapOvr>
+  <mc:AlternateContent xmlns:mc="http://schemas.openxmlformats.org/markup-compatibility/2006" xmlns:p14="http://schemas.microsoft.com/office/powerpoint/2010/main">
+    <mc:Choice Requires="p14">
+      <p:transition p14:dur="400">
+        <p:push dir="u"/>
+      </p:transition>
+    </mc:Choice>
+    <mc:Fallback xmlns="">
+      <p:transition xmlns:p14="http://schemas.microsoft.com/office/powerpoint/2010/main">
+        <p:push dir="u"/>
+      </p:transition>
+    </mc:Fallback>
+  </mc:AlternateContent>
+  <p:timing>
+    <p:tnLst>
+      <p:par>
+        <p:cTn xmlns:p14="http://schemas.microsoft.com/office/powerpoint/2010/main" id="1" dur="indefinite" restart="never" nodeType="tmRoot"/>
+      </p:par>
+    </p:tnLst>
+  </p:timing>
+</p:sld>
+</file>
+
+<file path=ppt/slides/slide19.xml><?xml version="1.0" encoding="utf-8"?>
+<p:sld xmlns:a="http://schemas.openxmlformats.org/drawingml/2006/main" xmlns:r="http://schemas.openxmlformats.org/officeDocument/2006/relationships" xmlns:p="http://schemas.openxmlformats.org/presentationml/2006/main">
+  <p:cSld>
+    <p:spTree>
+      <p:nvGrpSpPr>
+        <p:cNvPr id="1" name=""/>
+        <p:cNvGrpSpPr/>
+        <p:nvPr/>
+      </p:nvGrpSpPr>
+      <p:grpSpPr>
+        <a:xfrm>
+          <a:off x="0" y="0"/>
+          <a:ext cx="0" cy="0"/>
+          <a:chOff x="0" y="0"/>
+          <a:chExt cx="0" cy="0"/>
+        </a:xfrm>
+      </p:grpSpPr>
+      <p:sp>
+        <p:nvSpPr>
+          <p:cNvPr id="2" name="Title 1"/>
+          <p:cNvSpPr>
+            <a:spLocks noGrp="1"/>
+          </p:cNvSpPr>
+          <p:nvPr>
+            <p:ph type="title"/>
+          </p:nvPr>
+        </p:nvSpPr>
+        <p:spPr/>
+        <p:txBody>
+          <a:bodyPr>
+            <a:normAutofit/>
+          </a:bodyPr>
+          <a:lstStyle/>
+          <a:p>
+            <a:r>
+              <a:rPr lang="en-US" dirty="0" smtClean="0">
+                <a:latin typeface="Andale Mono"/>
+                <a:cs typeface="Andale Mono"/>
+              </a:rPr>
+              <a:t>Sensor </a:t>
+            </a:r>
+            <a:r>
+              <a:rPr lang="en-US" dirty="0" err="1" smtClean="0">
+                <a:latin typeface="Andale Mono"/>
+                <a:cs typeface="Andale Mono"/>
+              </a:rPr>
+              <a:t>ultrass</a:t>
+            </a:r>
+            <a:r>
+              <a:rPr lang="en-US" dirty="0" err="1" smtClean="0">
+                <a:latin typeface="Andale Mono"/>
+                <a:cs typeface="Andale Mono"/>
+              </a:rPr>
+              <a:t>ônico</a:t>
+            </a:r>
+            <a:endParaRPr lang="en-US" dirty="0">
+              <a:latin typeface="Andale Mono"/>
+              <a:cs typeface="Andale Mono"/>
+            </a:endParaRPr>
+          </a:p>
+        </p:txBody>
+      </p:sp>
+      <p:pic>
+        <p:nvPicPr>
+          <p:cNvPr id="3" name="Picture 2" descr="Sensor ultrassônico.png"/>
+          <p:cNvPicPr>
+            <a:picLocks noChangeAspect="1"/>
+          </p:cNvPicPr>
+          <p:nvPr/>
+        </p:nvPicPr>
+        <p:blipFill>
+          <a:blip r:embed="rId2">
+            <a:extLst>
+              <a:ext uri="{28A0092B-C50C-407E-A947-70E740481C1C}">
+                <a14:useLocalDpi xmlns:a14="http://schemas.microsoft.com/office/drawing/2010/main" val="0"/>
+              </a:ext>
+            </a:extLst>
+          </a:blip>
+          <a:stretch>
+            <a:fillRect/>
+          </a:stretch>
+        </p:blipFill>
+        <p:spPr>
+          <a:xfrm>
+            <a:off x="0" y="1615881"/>
+            <a:ext cx="9144000" cy="4841436"/>
+          </a:xfrm>
+          <a:prstGeom prst="rect">
+            <a:avLst/>
+          </a:prstGeom>
+        </p:spPr>
+      </p:pic>
+    </p:spTree>
+    <p:extLst>
+      <p:ext uri="{BB962C8B-B14F-4D97-AF65-F5344CB8AC3E}">
+        <p14:creationId xmlns:p14="http://schemas.microsoft.com/office/powerpoint/2010/main" val="4287650293"/>
       </p:ext>
     </p:extLst>
   </p:cSld>
@@ -4234,6 +5301,932 @@
     <p:extLst>
       <p:ext uri="{BB962C8B-B14F-4D97-AF65-F5344CB8AC3E}">
         <p14:creationId xmlns:p14="http://schemas.microsoft.com/office/powerpoint/2010/main" val="642043517"/>
+      </p:ext>
+    </p:extLst>
+  </p:cSld>
+  <p:clrMapOvr>
+    <a:masterClrMapping/>
+  </p:clrMapOvr>
+  <mc:AlternateContent xmlns:mc="http://schemas.openxmlformats.org/markup-compatibility/2006" xmlns:p14="http://schemas.microsoft.com/office/powerpoint/2010/main">
+    <mc:Choice Requires="p14">
+      <p:transition p14:dur="400">
+        <p:push dir="u"/>
+      </p:transition>
+    </mc:Choice>
+    <mc:Fallback xmlns="">
+      <p:transition xmlns:p14="http://schemas.microsoft.com/office/powerpoint/2010/main">
+        <p:push dir="u"/>
+      </p:transition>
+    </mc:Fallback>
+  </mc:AlternateContent>
+  <p:timing>
+    <p:tnLst>
+      <p:par>
+        <p:cTn xmlns:p14="http://schemas.microsoft.com/office/powerpoint/2010/main" id="1" dur="indefinite" restart="never" nodeType="tmRoot"/>
+      </p:par>
+    </p:tnLst>
+  </p:timing>
+</p:sld>
+</file>
+
+<file path=ppt/slides/slide20.xml><?xml version="1.0" encoding="utf-8"?>
+<p:sld xmlns:a="http://schemas.openxmlformats.org/drawingml/2006/main" xmlns:r="http://schemas.openxmlformats.org/officeDocument/2006/relationships" xmlns:p="http://schemas.openxmlformats.org/presentationml/2006/main">
+  <p:cSld>
+    <p:spTree>
+      <p:nvGrpSpPr>
+        <p:cNvPr id="1" name=""/>
+        <p:cNvGrpSpPr/>
+        <p:nvPr/>
+      </p:nvGrpSpPr>
+      <p:grpSpPr>
+        <a:xfrm>
+          <a:off x="0" y="0"/>
+          <a:ext cx="0" cy="0"/>
+          <a:chOff x="0" y="0"/>
+          <a:chExt cx="0" cy="0"/>
+        </a:xfrm>
+      </p:grpSpPr>
+      <p:sp>
+        <p:nvSpPr>
+          <p:cNvPr id="2" name="Title 1"/>
+          <p:cNvSpPr>
+            <a:spLocks noGrp="1"/>
+          </p:cNvSpPr>
+          <p:nvPr>
+            <p:ph type="title"/>
+          </p:nvPr>
+        </p:nvSpPr>
+        <p:spPr/>
+        <p:txBody>
+          <a:bodyPr>
+            <a:normAutofit/>
+          </a:bodyPr>
+          <a:lstStyle/>
+          <a:p>
+            <a:r>
+              <a:rPr lang="en-US" dirty="0" smtClean="0">
+                <a:latin typeface="Andale Mono"/>
+                <a:cs typeface="Andale Mono"/>
+              </a:rPr>
+              <a:t>Sensor </a:t>
+            </a:r>
+            <a:r>
+              <a:rPr lang="en-US" dirty="0" err="1" smtClean="0">
+                <a:latin typeface="Andale Mono"/>
+                <a:cs typeface="Andale Mono"/>
+              </a:rPr>
+              <a:t>ultrass</a:t>
+            </a:r>
+            <a:r>
+              <a:rPr lang="en-US" dirty="0" err="1" smtClean="0">
+                <a:latin typeface="Andale Mono"/>
+                <a:cs typeface="Andale Mono"/>
+              </a:rPr>
+              <a:t>ônico</a:t>
+            </a:r>
+            <a:endParaRPr lang="en-US" dirty="0">
+              <a:latin typeface="Andale Mono"/>
+              <a:cs typeface="Andale Mono"/>
+            </a:endParaRPr>
+          </a:p>
+        </p:txBody>
+      </p:sp>
+      <p:pic>
+        <p:nvPicPr>
+          <p:cNvPr id="5" name="Picture 4"/>
+          <p:cNvPicPr>
+            <a:picLocks noChangeAspect="1"/>
+          </p:cNvPicPr>
+          <p:nvPr/>
+        </p:nvPicPr>
+        <p:blipFill>
+          <a:blip r:embed="rId2"/>
+          <a:stretch>
+            <a:fillRect/>
+          </a:stretch>
+        </p:blipFill>
+        <p:spPr>
+          <a:xfrm>
+            <a:off x="1859616" y="2028263"/>
+            <a:ext cx="5424768" cy="4037853"/>
+          </a:xfrm>
+          <a:prstGeom prst="rect">
+            <a:avLst/>
+          </a:prstGeom>
+          <a:ln>
+            <a:noFill/>
+          </a:ln>
+          <a:effectLst>
+            <a:outerShdw blurRad="292100" dist="139700" dir="2700000" algn="tl" rotWithShape="0">
+              <a:srgbClr val="333333">
+                <a:alpha val="65000"/>
+              </a:srgbClr>
+            </a:outerShdw>
+          </a:effectLst>
+        </p:spPr>
+      </p:pic>
+    </p:spTree>
+    <p:extLst>
+      <p:ext uri="{BB962C8B-B14F-4D97-AF65-F5344CB8AC3E}">
+        <p14:creationId xmlns:p14="http://schemas.microsoft.com/office/powerpoint/2010/main" val="2154451520"/>
+      </p:ext>
+    </p:extLst>
+  </p:cSld>
+  <p:clrMapOvr>
+    <a:masterClrMapping/>
+  </p:clrMapOvr>
+  <mc:AlternateContent xmlns:mc="http://schemas.openxmlformats.org/markup-compatibility/2006" xmlns:p14="http://schemas.microsoft.com/office/powerpoint/2010/main">
+    <mc:Choice Requires="p14">
+      <p:transition p14:dur="400">
+        <p:push dir="u"/>
+      </p:transition>
+    </mc:Choice>
+    <mc:Fallback xmlns="">
+      <p:transition xmlns:p14="http://schemas.microsoft.com/office/powerpoint/2010/main">
+        <p:push dir="u"/>
+      </p:transition>
+    </mc:Fallback>
+  </mc:AlternateContent>
+  <p:timing>
+    <p:tnLst>
+      <p:par>
+        <p:cTn xmlns:p14="http://schemas.microsoft.com/office/powerpoint/2010/main" id="1" dur="indefinite" restart="never" nodeType="tmRoot"/>
+      </p:par>
+    </p:tnLst>
+  </p:timing>
+</p:sld>
+</file>
+
+<file path=ppt/slides/slide21.xml><?xml version="1.0" encoding="utf-8"?>
+<p:sld xmlns:a="http://schemas.openxmlformats.org/drawingml/2006/main" xmlns:r="http://schemas.openxmlformats.org/officeDocument/2006/relationships" xmlns:p="http://schemas.openxmlformats.org/presentationml/2006/main">
+  <p:cSld>
+    <p:spTree>
+      <p:nvGrpSpPr>
+        <p:cNvPr id="1" name=""/>
+        <p:cNvGrpSpPr/>
+        <p:nvPr/>
+      </p:nvGrpSpPr>
+      <p:grpSpPr>
+        <a:xfrm>
+          <a:off x="0" y="0"/>
+          <a:ext cx="0" cy="0"/>
+          <a:chOff x="0" y="0"/>
+          <a:chExt cx="0" cy="0"/>
+        </a:xfrm>
+      </p:grpSpPr>
+      <p:sp>
+        <p:nvSpPr>
+          <p:cNvPr id="2" name="Title 1"/>
+          <p:cNvSpPr>
+            <a:spLocks noGrp="1"/>
+          </p:cNvSpPr>
+          <p:nvPr>
+            <p:ph type="title"/>
+          </p:nvPr>
+        </p:nvSpPr>
+        <p:spPr/>
+        <p:txBody>
+          <a:bodyPr>
+            <a:normAutofit/>
+          </a:bodyPr>
+          <a:lstStyle/>
+          <a:p>
+            <a:r>
+              <a:rPr lang="en-US" dirty="0" smtClean="0">
+                <a:latin typeface="Andale Mono"/>
+                <a:cs typeface="Andale Mono"/>
+              </a:rPr>
+              <a:t>Sensor </a:t>
+            </a:r>
+            <a:r>
+              <a:rPr lang="en-US" dirty="0" err="1" smtClean="0">
+                <a:latin typeface="Andale Mono"/>
+                <a:cs typeface="Andale Mono"/>
+              </a:rPr>
+              <a:t>ultrass</a:t>
+            </a:r>
+            <a:r>
+              <a:rPr lang="en-US" dirty="0" err="1" smtClean="0">
+                <a:latin typeface="Andale Mono"/>
+                <a:cs typeface="Andale Mono"/>
+              </a:rPr>
+              <a:t>ônico</a:t>
+            </a:r>
+            <a:endParaRPr lang="en-US" dirty="0">
+              <a:latin typeface="Andale Mono"/>
+              <a:cs typeface="Andale Mono"/>
+            </a:endParaRPr>
+          </a:p>
+        </p:txBody>
+      </p:sp>
+      <p:pic>
+        <p:nvPicPr>
+          <p:cNvPr id="5" name="Picture 4"/>
+          <p:cNvPicPr>
+            <a:picLocks noChangeAspect="1"/>
+          </p:cNvPicPr>
+          <p:nvPr/>
+        </p:nvPicPr>
+        <p:blipFill>
+          <a:blip r:embed="rId2"/>
+          <a:stretch>
+            <a:fillRect/>
+          </a:stretch>
+        </p:blipFill>
+        <p:spPr>
+          <a:xfrm>
+            <a:off x="85166" y="1494115"/>
+            <a:ext cx="8973668" cy="5094940"/>
+          </a:xfrm>
+          <a:prstGeom prst="rect">
+            <a:avLst/>
+          </a:prstGeom>
+          <a:ln>
+            <a:noFill/>
+          </a:ln>
+          <a:effectLst>
+            <a:outerShdw blurRad="292100" dist="139700" dir="2700000" algn="tl" rotWithShape="0">
+              <a:srgbClr val="333333">
+                <a:alpha val="65000"/>
+              </a:srgbClr>
+            </a:outerShdw>
+          </a:effectLst>
+        </p:spPr>
+      </p:pic>
+    </p:spTree>
+    <p:extLst>
+      <p:ext uri="{BB962C8B-B14F-4D97-AF65-F5344CB8AC3E}">
+        <p14:creationId xmlns:p14="http://schemas.microsoft.com/office/powerpoint/2010/main" val="464042028"/>
+      </p:ext>
+    </p:extLst>
+  </p:cSld>
+  <p:clrMapOvr>
+    <a:masterClrMapping/>
+  </p:clrMapOvr>
+  <mc:AlternateContent xmlns:mc="http://schemas.openxmlformats.org/markup-compatibility/2006" xmlns:p14="http://schemas.microsoft.com/office/powerpoint/2010/main">
+    <mc:Choice Requires="p14">
+      <p:transition p14:dur="400">
+        <p:push dir="u"/>
+      </p:transition>
+    </mc:Choice>
+    <mc:Fallback xmlns="">
+      <p:transition xmlns:p14="http://schemas.microsoft.com/office/powerpoint/2010/main">
+        <p:push dir="u"/>
+      </p:transition>
+    </mc:Fallback>
+  </mc:AlternateContent>
+  <p:timing>
+    <p:tnLst>
+      <p:par>
+        <p:cTn xmlns:p14="http://schemas.microsoft.com/office/powerpoint/2010/main" id="1" dur="indefinite" restart="never" nodeType="tmRoot"/>
+      </p:par>
+    </p:tnLst>
+  </p:timing>
+</p:sld>
+</file>
+
+<file path=ppt/slides/slide22.xml><?xml version="1.0" encoding="utf-8"?>
+<p:sld xmlns:a="http://schemas.openxmlformats.org/drawingml/2006/main" xmlns:r="http://schemas.openxmlformats.org/officeDocument/2006/relationships" xmlns:p="http://schemas.openxmlformats.org/presentationml/2006/main">
+  <p:cSld>
+    <p:spTree>
+      <p:nvGrpSpPr>
+        <p:cNvPr id="1" name=""/>
+        <p:cNvGrpSpPr/>
+        <p:nvPr/>
+      </p:nvGrpSpPr>
+      <p:grpSpPr>
+        <a:xfrm>
+          <a:off x="0" y="0"/>
+          <a:ext cx="0" cy="0"/>
+          <a:chOff x="0" y="0"/>
+          <a:chExt cx="0" cy="0"/>
+        </a:xfrm>
+      </p:grpSpPr>
+      <p:sp>
+        <p:nvSpPr>
+          <p:cNvPr id="2" name="Title 1"/>
+          <p:cNvSpPr>
+            <a:spLocks noGrp="1"/>
+          </p:cNvSpPr>
+          <p:nvPr>
+            <p:ph type="title"/>
+          </p:nvPr>
+        </p:nvSpPr>
+        <p:spPr/>
+        <p:txBody>
+          <a:bodyPr>
+            <a:normAutofit fontScale="90000"/>
+          </a:bodyPr>
+          <a:lstStyle/>
+          <a:p>
+            <a:r>
+              <a:rPr lang="en-US" dirty="0" smtClean="0">
+                <a:latin typeface="Andale Mono"/>
+                <a:cs typeface="Andale Mono"/>
+              </a:rPr>
+              <a:t>Sensor </a:t>
+            </a:r>
+            <a:r>
+              <a:rPr lang="en-US" dirty="0" err="1" smtClean="0">
+                <a:latin typeface="Andale Mono"/>
+                <a:cs typeface="Andale Mono"/>
+              </a:rPr>
+              <a:t>ultrass</a:t>
+            </a:r>
+            <a:r>
+              <a:rPr lang="en-US" dirty="0" err="1" smtClean="0">
+                <a:latin typeface="Andale Mono"/>
+                <a:cs typeface="Andale Mono"/>
+              </a:rPr>
+              <a:t>ônico</a:t>
+            </a:r>
+            <a:r>
+              <a:rPr lang="en-US" dirty="0" smtClean="0">
+                <a:latin typeface="Andale Mono"/>
+                <a:cs typeface="Andale Mono"/>
+              </a:rPr>
+              <a:t> e LCD</a:t>
+            </a:r>
+            <a:endParaRPr lang="en-US" dirty="0">
+              <a:latin typeface="Andale Mono"/>
+              <a:cs typeface="Andale Mono"/>
+            </a:endParaRPr>
+          </a:p>
+        </p:txBody>
+      </p:sp>
+      <p:pic>
+        <p:nvPicPr>
+          <p:cNvPr id="5" name="Picture 4" descr="LCD e sensor ultrassônico.png"/>
+          <p:cNvPicPr>
+            <a:picLocks noChangeAspect="1"/>
+          </p:cNvPicPr>
+          <p:nvPr/>
+        </p:nvPicPr>
+        <p:blipFill>
+          <a:blip r:embed="rId2">
+            <a:extLst>
+              <a:ext uri="{28A0092B-C50C-407E-A947-70E740481C1C}">
+                <a14:useLocalDpi xmlns:a14="http://schemas.microsoft.com/office/drawing/2010/main" val="0"/>
+              </a:ext>
+            </a:extLst>
+          </a:blip>
+          <a:stretch>
+            <a:fillRect/>
+          </a:stretch>
+        </p:blipFill>
+        <p:spPr>
+          <a:xfrm>
+            <a:off x="0" y="1511294"/>
+            <a:ext cx="9144000" cy="4841436"/>
+          </a:xfrm>
+          <a:prstGeom prst="rect">
+            <a:avLst/>
+          </a:prstGeom>
+        </p:spPr>
+      </p:pic>
+    </p:spTree>
+    <p:extLst>
+      <p:ext uri="{BB962C8B-B14F-4D97-AF65-F5344CB8AC3E}">
+        <p14:creationId xmlns:p14="http://schemas.microsoft.com/office/powerpoint/2010/main" val="2121235944"/>
+      </p:ext>
+    </p:extLst>
+  </p:cSld>
+  <p:clrMapOvr>
+    <a:masterClrMapping/>
+  </p:clrMapOvr>
+  <mc:AlternateContent xmlns:mc="http://schemas.openxmlformats.org/markup-compatibility/2006" xmlns:p14="http://schemas.microsoft.com/office/powerpoint/2010/main">
+    <mc:Choice Requires="p14">
+      <p:transition p14:dur="400">
+        <p:push dir="u"/>
+      </p:transition>
+    </mc:Choice>
+    <mc:Fallback xmlns="">
+      <p:transition xmlns:p14="http://schemas.microsoft.com/office/powerpoint/2010/main">
+        <p:push dir="u"/>
+      </p:transition>
+    </mc:Fallback>
+  </mc:AlternateContent>
+  <p:timing>
+    <p:tnLst>
+      <p:par>
+        <p:cTn xmlns:p14="http://schemas.microsoft.com/office/powerpoint/2010/main" id="1" dur="indefinite" restart="never" nodeType="tmRoot"/>
+      </p:par>
+    </p:tnLst>
+  </p:timing>
+</p:sld>
+</file>
+
+<file path=ppt/slides/slide23.xml><?xml version="1.0" encoding="utf-8"?>
+<p:sld xmlns:a="http://schemas.openxmlformats.org/drawingml/2006/main" xmlns:r="http://schemas.openxmlformats.org/officeDocument/2006/relationships" xmlns:p="http://schemas.openxmlformats.org/presentationml/2006/main">
+  <p:cSld>
+    <p:spTree>
+      <p:nvGrpSpPr>
+        <p:cNvPr id="1" name=""/>
+        <p:cNvGrpSpPr/>
+        <p:nvPr/>
+      </p:nvGrpSpPr>
+      <p:grpSpPr>
+        <a:xfrm>
+          <a:off x="0" y="0"/>
+          <a:ext cx="0" cy="0"/>
+          <a:chOff x="0" y="0"/>
+          <a:chExt cx="0" cy="0"/>
+        </a:xfrm>
+      </p:grpSpPr>
+      <p:sp>
+        <p:nvSpPr>
+          <p:cNvPr id="2" name="Title 1"/>
+          <p:cNvSpPr>
+            <a:spLocks noGrp="1"/>
+          </p:cNvSpPr>
+          <p:nvPr>
+            <p:ph type="title"/>
+          </p:nvPr>
+        </p:nvSpPr>
+        <p:spPr/>
+        <p:txBody>
+          <a:bodyPr>
+            <a:normAutofit fontScale="90000"/>
+          </a:bodyPr>
+          <a:lstStyle/>
+          <a:p>
+            <a:r>
+              <a:rPr lang="en-US" dirty="0" smtClean="0">
+                <a:latin typeface="Andale Mono"/>
+                <a:cs typeface="Andale Mono"/>
+              </a:rPr>
+              <a:t>Sensor </a:t>
+            </a:r>
+            <a:r>
+              <a:rPr lang="en-US" dirty="0" err="1" smtClean="0">
+                <a:latin typeface="Andale Mono"/>
+                <a:cs typeface="Andale Mono"/>
+              </a:rPr>
+              <a:t>ultrass</a:t>
+            </a:r>
+            <a:r>
+              <a:rPr lang="en-US" dirty="0" err="1" smtClean="0">
+                <a:latin typeface="Andale Mono"/>
+                <a:cs typeface="Andale Mono"/>
+              </a:rPr>
+              <a:t>ônico</a:t>
+            </a:r>
+            <a:r>
+              <a:rPr lang="en-US" dirty="0" smtClean="0">
+                <a:latin typeface="Andale Mono"/>
+                <a:cs typeface="Andale Mono"/>
+              </a:rPr>
+              <a:t> e LCD</a:t>
+            </a:r>
+            <a:endParaRPr lang="en-US" dirty="0">
+              <a:latin typeface="Andale Mono"/>
+              <a:cs typeface="Andale Mono"/>
+            </a:endParaRPr>
+          </a:p>
+        </p:txBody>
+      </p:sp>
+      <p:pic>
+        <p:nvPicPr>
+          <p:cNvPr id="4" name="Picture 3"/>
+          <p:cNvPicPr>
+            <a:picLocks noChangeAspect="1"/>
+          </p:cNvPicPr>
+          <p:nvPr/>
+        </p:nvPicPr>
+        <p:blipFill>
+          <a:blip r:embed="rId2"/>
+          <a:stretch>
+            <a:fillRect/>
+          </a:stretch>
+        </p:blipFill>
+        <p:spPr>
+          <a:xfrm>
+            <a:off x="268718" y="1776501"/>
+            <a:ext cx="8606564" cy="4513729"/>
+          </a:xfrm>
+          <a:prstGeom prst="rect">
+            <a:avLst/>
+          </a:prstGeom>
+          <a:ln>
+            <a:noFill/>
+          </a:ln>
+          <a:effectLst>
+            <a:outerShdw blurRad="292100" dist="139700" dir="2700000" algn="tl" rotWithShape="0">
+              <a:srgbClr val="333333">
+                <a:alpha val="65000"/>
+              </a:srgbClr>
+            </a:outerShdw>
+          </a:effectLst>
+        </p:spPr>
+      </p:pic>
+    </p:spTree>
+    <p:extLst>
+      <p:ext uri="{BB962C8B-B14F-4D97-AF65-F5344CB8AC3E}">
+        <p14:creationId xmlns:p14="http://schemas.microsoft.com/office/powerpoint/2010/main" val="2840833244"/>
+      </p:ext>
+    </p:extLst>
+  </p:cSld>
+  <p:clrMapOvr>
+    <a:masterClrMapping/>
+  </p:clrMapOvr>
+  <mc:AlternateContent xmlns:mc="http://schemas.openxmlformats.org/markup-compatibility/2006" xmlns:p14="http://schemas.microsoft.com/office/powerpoint/2010/main">
+    <mc:Choice Requires="p14">
+      <p:transition p14:dur="400">
+        <p:push dir="u"/>
+      </p:transition>
+    </mc:Choice>
+    <mc:Fallback xmlns="">
+      <p:transition xmlns:p14="http://schemas.microsoft.com/office/powerpoint/2010/main">
+        <p:push dir="u"/>
+      </p:transition>
+    </mc:Fallback>
+  </mc:AlternateContent>
+  <p:timing>
+    <p:tnLst>
+      <p:par>
+        <p:cTn xmlns:p14="http://schemas.microsoft.com/office/powerpoint/2010/main" id="1" dur="indefinite" restart="never" nodeType="tmRoot"/>
+      </p:par>
+    </p:tnLst>
+  </p:timing>
+</p:sld>
+</file>
+
+<file path=ppt/slides/slide24.xml><?xml version="1.0" encoding="utf-8"?>
+<p:sld xmlns:a="http://schemas.openxmlformats.org/drawingml/2006/main" xmlns:r="http://schemas.openxmlformats.org/officeDocument/2006/relationships" xmlns:p="http://schemas.openxmlformats.org/presentationml/2006/main">
+  <p:cSld>
+    <p:spTree>
+      <p:nvGrpSpPr>
+        <p:cNvPr id="1" name=""/>
+        <p:cNvGrpSpPr/>
+        <p:nvPr/>
+      </p:nvGrpSpPr>
+      <p:grpSpPr>
+        <a:xfrm>
+          <a:off x="0" y="0"/>
+          <a:ext cx="0" cy="0"/>
+          <a:chOff x="0" y="0"/>
+          <a:chExt cx="0" cy="0"/>
+        </a:xfrm>
+      </p:grpSpPr>
+      <p:sp>
+        <p:nvSpPr>
+          <p:cNvPr id="2" name="Title 1"/>
+          <p:cNvSpPr>
+            <a:spLocks noGrp="1"/>
+          </p:cNvSpPr>
+          <p:nvPr>
+            <p:ph type="title"/>
+          </p:nvPr>
+        </p:nvSpPr>
+        <p:spPr/>
+        <p:txBody>
+          <a:bodyPr/>
+          <a:lstStyle/>
+          <a:p>
+            <a:r>
+              <a:rPr lang="en-US" dirty="0" err="1" smtClean="0">
+                <a:latin typeface="Andale Mono"/>
+                <a:cs typeface="Andale Mono"/>
+              </a:rPr>
+              <a:t>Referências</a:t>
+            </a:r>
+            <a:endParaRPr lang="en-US" dirty="0">
+              <a:latin typeface="Andale Mono"/>
+              <a:cs typeface="Andale Mono"/>
+            </a:endParaRPr>
+          </a:p>
+        </p:txBody>
+      </p:sp>
+      <p:sp>
+        <p:nvSpPr>
+          <p:cNvPr id="3" name="Content Placeholder 2"/>
+          <p:cNvSpPr>
+            <a:spLocks noGrp="1"/>
+          </p:cNvSpPr>
+          <p:nvPr>
+            <p:ph idx="1"/>
+          </p:nvPr>
+        </p:nvSpPr>
+        <p:spPr>
+          <a:xfrm>
+            <a:off x="457200" y="1252481"/>
+            <a:ext cx="8229600" cy="5047233"/>
+          </a:xfrm>
+        </p:spPr>
+        <p:txBody>
+          <a:bodyPr>
+            <a:normAutofit/>
+          </a:bodyPr>
+          <a:lstStyle/>
+          <a:p>
+            <a:r>
+              <a:rPr lang="en-US" sz="2200" dirty="0">
+                <a:latin typeface="Andale Mono"/>
+                <a:cs typeface="Andale Mono"/>
+                <a:hlinkClick r:id="rId2"/>
+              </a:rPr>
+              <a:t>https://</a:t>
+            </a:r>
+            <a:r>
+              <a:rPr lang="en-US" sz="2200" dirty="0" smtClean="0">
+                <a:latin typeface="Andale Mono"/>
+                <a:cs typeface="Andale Mono"/>
+                <a:hlinkClick r:id="rId2"/>
+              </a:rPr>
+              <a:t>www.arduino.cc</a:t>
+            </a:r>
+            <a:endParaRPr lang="en-US" sz="2200" dirty="0" smtClean="0">
+              <a:latin typeface="Andale Mono"/>
+              <a:cs typeface="Andale Mono"/>
+            </a:endParaRPr>
+          </a:p>
+          <a:p>
+            <a:r>
+              <a:rPr lang="en-US" sz="2200" dirty="0">
+                <a:latin typeface="Andale Mono"/>
+                <a:cs typeface="Andale Mono"/>
+                <a:hlinkClick r:id="rId3"/>
+              </a:rPr>
+              <a:t>https://www.arduino.cc/reference/</a:t>
+            </a:r>
+            <a:r>
+              <a:rPr lang="en-US" sz="2200" dirty="0" smtClean="0">
+                <a:latin typeface="Andale Mono"/>
+                <a:cs typeface="Andale Mono"/>
+                <a:hlinkClick r:id="rId3"/>
+              </a:rPr>
+              <a:t>en</a:t>
+            </a:r>
+            <a:endParaRPr lang="en-US" sz="2200" dirty="0">
+              <a:latin typeface="Andale Mono"/>
+              <a:cs typeface="Andale Mono"/>
+            </a:endParaRPr>
+          </a:p>
+          <a:p>
+            <a:r>
+              <a:rPr lang="en-US" sz="2200" dirty="0" smtClean="0">
+                <a:latin typeface="Andale Mono"/>
+                <a:cs typeface="Andale Mono"/>
+                <a:hlinkClick r:id="rId4"/>
+              </a:rPr>
+              <a:t>https</a:t>
+            </a:r>
+            <a:r>
+              <a:rPr lang="en-US" sz="2200" dirty="0">
+                <a:latin typeface="Andale Mono"/>
+                <a:cs typeface="Andale Mono"/>
+                <a:hlinkClick r:id="rId4"/>
+              </a:rPr>
+              <a:t>://</a:t>
+            </a:r>
+            <a:r>
+              <a:rPr lang="en-US" sz="2200" dirty="0" smtClean="0">
+                <a:latin typeface="Andale Mono"/>
+                <a:cs typeface="Andale Mono"/>
+                <a:hlinkClick r:id="rId4"/>
+              </a:rPr>
+              <a:t>www.tinkercad.com</a:t>
+            </a:r>
+            <a:endParaRPr lang="en-US" sz="2200" dirty="0" smtClean="0">
+              <a:latin typeface="Andale Mono"/>
+              <a:cs typeface="Andale Mono"/>
+            </a:endParaRPr>
+          </a:p>
+          <a:p>
+            <a:r>
+              <a:rPr lang="en-US" sz="2200" dirty="0">
+                <a:latin typeface="Andale Mono"/>
+                <a:cs typeface="Andale Mono"/>
+                <a:hlinkClick r:id="rId5"/>
+              </a:rPr>
+              <a:t>https://www.arduino.cc/en/Tutorial/</a:t>
+            </a:r>
+            <a:r>
+              <a:rPr lang="en-US" sz="2200" dirty="0" smtClean="0">
+                <a:latin typeface="Andale Mono"/>
+                <a:cs typeface="Andale Mono"/>
+                <a:hlinkClick r:id="rId5"/>
+              </a:rPr>
+              <a:t>Knob</a:t>
+            </a:r>
+            <a:endParaRPr lang="en-US" sz="2200" dirty="0" smtClean="0">
+              <a:latin typeface="Andale Mono"/>
+              <a:cs typeface="Andale Mono"/>
+            </a:endParaRPr>
+          </a:p>
+          <a:p>
+            <a:r>
+              <a:rPr lang="en-US" sz="2200" dirty="0" smtClean="0">
+                <a:latin typeface="Andale Mono"/>
+                <a:cs typeface="Andale Mono"/>
+                <a:hlinkClick r:id="rId6"/>
+              </a:rPr>
+              <a:t>http</a:t>
+            </a:r>
+            <a:r>
+              <a:rPr lang="en-US" sz="2200" dirty="0">
+                <a:latin typeface="Andale Mono"/>
+                <a:cs typeface="Andale Mono"/>
+                <a:hlinkClick r:id="rId6"/>
+              </a:rPr>
+              <a:t>://www.arduino.cc/en/Tutorial/</a:t>
+            </a:r>
+            <a:r>
+              <a:rPr lang="en-US" sz="2200" dirty="0" smtClean="0">
+                <a:latin typeface="Andale Mono"/>
+                <a:cs typeface="Andale Mono"/>
+                <a:hlinkClick r:id="rId6"/>
+              </a:rPr>
+              <a:t>Ping</a:t>
+            </a:r>
+            <a:endParaRPr lang="en-US" sz="2200" dirty="0" smtClean="0">
+              <a:latin typeface="Andale Mono"/>
+              <a:cs typeface="Andale Mono"/>
+            </a:endParaRPr>
+          </a:p>
+          <a:p>
+            <a:r>
+              <a:rPr lang="en-US" sz="2200" dirty="0">
+                <a:latin typeface="Andale Mono"/>
+                <a:cs typeface="Andale Mono"/>
+                <a:hlinkClick r:id="rId7"/>
+              </a:rPr>
+              <a:t>http://www.arduino.cc/en/Tutorial/</a:t>
+            </a:r>
+            <a:r>
+              <a:rPr lang="en-US" sz="2200" dirty="0" smtClean="0">
+                <a:latin typeface="Andale Mono"/>
+                <a:cs typeface="Andale Mono"/>
+                <a:hlinkClick r:id="rId7"/>
+              </a:rPr>
+              <a:t>LiquidCrystal</a:t>
+            </a:r>
+            <a:endParaRPr lang="en-US" sz="2200" dirty="0" smtClean="0">
+              <a:latin typeface="Andale Mono"/>
+              <a:cs typeface="Andale Mono"/>
+            </a:endParaRPr>
+          </a:p>
+          <a:p>
+            <a:endParaRPr lang="en-US" sz="2200" dirty="0" smtClean="0">
+              <a:latin typeface="Andale Mono"/>
+              <a:cs typeface="Andale Mono"/>
+            </a:endParaRPr>
+          </a:p>
+          <a:p>
+            <a:endParaRPr lang="en-US" sz="2200" dirty="0" smtClean="0">
+              <a:latin typeface="Andale Mono"/>
+              <a:cs typeface="Andale Mono"/>
+            </a:endParaRPr>
+          </a:p>
+          <a:p>
+            <a:endParaRPr lang="en-US" sz="2200" dirty="0" smtClean="0">
+              <a:latin typeface="Andale Mono"/>
+              <a:cs typeface="Andale Mono"/>
+            </a:endParaRPr>
+          </a:p>
+        </p:txBody>
+      </p:sp>
+    </p:spTree>
+    <p:extLst>
+      <p:ext uri="{BB962C8B-B14F-4D97-AF65-F5344CB8AC3E}">
+        <p14:creationId xmlns:p14="http://schemas.microsoft.com/office/powerpoint/2010/main" val="2102470656"/>
+      </p:ext>
+    </p:extLst>
+  </p:cSld>
+  <p:clrMapOvr>
+    <a:masterClrMapping/>
+  </p:clrMapOvr>
+  <mc:AlternateContent xmlns:mc="http://schemas.openxmlformats.org/markup-compatibility/2006" xmlns:p14="http://schemas.microsoft.com/office/powerpoint/2010/main">
+    <mc:Choice Requires="p14">
+      <p:transition p14:dur="400">
+        <p:push dir="u"/>
+      </p:transition>
+    </mc:Choice>
+    <mc:Fallback xmlns="">
+      <p:transition xmlns:p14="http://schemas.microsoft.com/office/powerpoint/2010/main">
+        <p:push dir="u"/>
+      </p:transition>
+    </mc:Fallback>
+  </mc:AlternateContent>
+  <p:timing>
+    <p:tnLst>
+      <p:par>
+        <p:cTn xmlns:p14="http://schemas.microsoft.com/office/powerpoint/2010/main" id="1" dur="indefinite" restart="never" nodeType="tmRoot"/>
+      </p:par>
+    </p:tnLst>
+  </p:timing>
+</p:sld>
+</file>
+
+<file path=ppt/slides/slide25.xml><?xml version="1.0" encoding="utf-8"?>
+<p:sld xmlns:a="http://schemas.openxmlformats.org/drawingml/2006/main" xmlns:r="http://schemas.openxmlformats.org/officeDocument/2006/relationships" xmlns:p="http://schemas.openxmlformats.org/presentationml/2006/main">
+  <p:cSld>
+    <p:spTree>
+      <p:nvGrpSpPr>
+        <p:cNvPr id="1" name=""/>
+        <p:cNvGrpSpPr/>
+        <p:nvPr/>
+      </p:nvGrpSpPr>
+      <p:grpSpPr>
+        <a:xfrm>
+          <a:off x="0" y="0"/>
+          <a:ext cx="0" cy="0"/>
+          <a:chOff x="0" y="0"/>
+          <a:chExt cx="0" cy="0"/>
+        </a:xfrm>
+      </p:grpSpPr>
+      <p:sp>
+        <p:nvSpPr>
+          <p:cNvPr id="2" name="Rectangle 1"/>
+          <p:cNvSpPr/>
+          <p:nvPr/>
+        </p:nvSpPr>
+        <p:spPr>
+          <a:xfrm>
+            <a:off x="1524531" y="915609"/>
+            <a:ext cx="6094938" cy="1077218"/>
+          </a:xfrm>
+          <a:prstGeom prst="rect">
+            <a:avLst/>
+          </a:prstGeom>
+        </p:spPr>
+        <p:txBody>
+          <a:bodyPr wrap="none">
+            <a:spAutoFit/>
+          </a:bodyPr>
+          <a:lstStyle/>
+          <a:p>
+            <a:r>
+              <a:rPr lang="en-US" sz="3200" dirty="0" smtClean="0">
+                <a:latin typeface="Andale Mono"/>
+                <a:cs typeface="Andale Mono"/>
+                <a:hlinkClick r:id="rId2"/>
+              </a:rPr>
+              <a:t>github.com</a:t>
+            </a:r>
+            <a:r>
+              <a:rPr lang="en-US" sz="3200" dirty="0">
+                <a:latin typeface="Andale Mono"/>
+                <a:cs typeface="Andale Mono"/>
+                <a:hlinkClick r:id="rId2"/>
+              </a:rPr>
+              <a:t>/fkuhne/</a:t>
+            </a:r>
+            <a:r>
+              <a:rPr lang="en-US" sz="3200" dirty="0" smtClean="0">
+                <a:latin typeface="Andale Mono"/>
+                <a:cs typeface="Andale Mono"/>
+                <a:hlinkClick r:id="rId2"/>
+              </a:rPr>
+              <a:t>aday18</a:t>
+            </a:r>
+            <a:endParaRPr lang="en-US" sz="3200" dirty="0" smtClean="0">
+              <a:latin typeface="Andale Mono"/>
+              <a:cs typeface="Andale Mono"/>
+            </a:endParaRPr>
+          </a:p>
+          <a:p>
+            <a:endParaRPr lang="en-US" sz="3200" dirty="0" smtClean="0">
+              <a:latin typeface="Andale Mono"/>
+              <a:cs typeface="Andale Mono"/>
+            </a:endParaRPr>
+          </a:p>
+        </p:txBody>
+      </p:sp>
+      <p:pic>
+        <p:nvPicPr>
+          <p:cNvPr id="3" name="Picture 2" descr="qrcode-github.png"/>
+          <p:cNvPicPr>
+            <a:picLocks noChangeAspect="1"/>
+          </p:cNvPicPr>
+          <p:nvPr/>
+        </p:nvPicPr>
+        <p:blipFill>
+          <a:blip r:embed="rId3">
+            <a:extLst>
+              <a:ext uri="{28A0092B-C50C-407E-A947-70E740481C1C}">
+                <a14:useLocalDpi xmlns:a14="http://schemas.microsoft.com/office/drawing/2010/main"/>
+              </a:ext>
+            </a:extLst>
+          </a:blip>
+          <a:stretch>
+            <a:fillRect/>
+          </a:stretch>
+        </p:blipFill>
+        <p:spPr>
+          <a:xfrm>
+            <a:off x="2667000" y="1960846"/>
+            <a:ext cx="3810000" cy="3810000"/>
+          </a:xfrm>
+          <a:prstGeom prst="rect">
+            <a:avLst/>
+          </a:prstGeom>
+        </p:spPr>
+      </p:pic>
+    </p:spTree>
+    <p:extLst>
+      <p:ext uri="{BB962C8B-B14F-4D97-AF65-F5344CB8AC3E}">
+        <p14:creationId xmlns:p14="http://schemas.microsoft.com/office/powerpoint/2010/main" val="2144527500"/>
       </p:ext>
     </p:extLst>
   </p:cSld>
@@ -4366,7 +6359,13 @@
           <p:nvPr/>
         </p:nvPicPr>
         <p:blipFill>
-          <a:blip r:embed="rId3"/>
+          <a:blip r:embed="rId3" cstate="email">
+            <a:extLst>
+              <a:ext uri="{28A0092B-C50C-407E-A947-70E740481C1C}">
+                <a14:useLocalDpi xmlns:a14="http://schemas.microsoft.com/office/drawing/2010/main"/>
+              </a:ext>
+            </a:extLst>
+          </a:blip>
           <a:stretch>
             <a:fillRect/>
           </a:stretch>
@@ -5297,22 +7296,28 @@
       </p:sp>
       <p:pic>
         <p:nvPicPr>
-          <p:cNvPr id="3" name="Picture 2"/>
+          <p:cNvPr id="4" name="Picture 3" descr="Blink.png"/>
           <p:cNvPicPr>
             <a:picLocks noChangeAspect="1"/>
           </p:cNvPicPr>
           <p:nvPr/>
         </p:nvPicPr>
         <p:blipFill>
-          <a:blip r:embed="rId2"/>
+          <a:blip r:embed="rId2">
+            <a:extLst>
+              <a:ext uri="{28A0092B-C50C-407E-A947-70E740481C1C}">
+                <a14:useLocalDpi xmlns:a14="http://schemas.microsoft.com/office/drawing/2010/main" val="0"/>
+              </a:ext>
+            </a:extLst>
+          </a:blip>
           <a:stretch>
             <a:fillRect/>
           </a:stretch>
         </p:blipFill>
         <p:spPr>
-          <a:xfrm rot="5400000">
-            <a:off x="2290315" y="1304645"/>
-            <a:ext cx="5305279" cy="5531265"/>
+          <a:xfrm>
+            <a:off x="0" y="1382874"/>
+            <a:ext cx="9144000" cy="4841436"/>
           </a:xfrm>
           <a:prstGeom prst="rect">
             <a:avLst/>
@@ -5384,18 +7389,11 @@
           <a:lstStyle/>
           <a:p>
             <a:r>
-              <a:rPr lang="en-US" dirty="0" err="1" smtClean="0">
-                <a:latin typeface="Andale Mono"/>
-                <a:cs typeface="Andale Mono"/>
-              </a:rPr>
-              <a:t>Botão</a:t>
-            </a:r>
-            <a:r>
               <a:rPr lang="en-US" dirty="0" smtClean="0">
                 <a:latin typeface="Andale Mono"/>
                 <a:cs typeface="Andale Mono"/>
               </a:rPr>
-              <a:t> e LED</a:t>
+              <a:t>Blink</a:t>
             </a:r>
             <a:endParaRPr lang="en-US" dirty="0">
               <a:latin typeface="Andale Mono"/>
@@ -5406,7 +7404,7 @@
       </p:sp>
       <p:pic>
         <p:nvPicPr>
-          <p:cNvPr id="4" name="Picture 3"/>
+          <p:cNvPr id="5" name="Picture 4"/>
           <p:cNvPicPr>
             <a:picLocks noChangeAspect="1"/>
           </p:cNvPicPr>
@@ -5420,18 +7418,28 @@
         </p:blipFill>
         <p:spPr>
           <a:xfrm>
-            <a:off x="1452122" y="1292924"/>
-            <a:ext cx="6239757" cy="5412675"/>
+            <a:off x="2175700" y="1706393"/>
+            <a:ext cx="4792601" cy="3445215"/>
           </a:xfrm>
           <a:prstGeom prst="rect">
             <a:avLst/>
           </a:prstGeom>
+          <a:ln>
+            <a:noFill/>
+          </a:ln>
+          <a:effectLst>
+            <a:outerShdw blurRad="292100" dist="139700" dir="2700000" algn="tl" rotWithShape="0">
+              <a:srgbClr val="333333">
+                <a:alpha val="65000"/>
+              </a:srgbClr>
+            </a:outerShdw>
+          </a:effectLst>
         </p:spPr>
       </p:pic>
     </p:spTree>
     <p:extLst>
       <p:ext uri="{BB962C8B-B14F-4D97-AF65-F5344CB8AC3E}">
-        <p14:creationId xmlns:p14="http://schemas.microsoft.com/office/powerpoint/2010/main" val="3564352374"/>
+        <p14:creationId xmlns:p14="http://schemas.microsoft.com/office/powerpoint/2010/main" val="4214645806"/>
       </p:ext>
     </p:extLst>
   </p:cSld>
@@ -5497,28 +7505,14 @@
                 <a:latin typeface="Andale Mono"/>
                 <a:cs typeface="Andale Mono"/>
               </a:rPr>
-              <a:t>Entrada</a:t>
+              <a:t>Botão</a:t>
             </a:r>
             <a:r>
               <a:rPr lang="en-US" dirty="0" smtClean="0">
                 <a:latin typeface="Andale Mono"/>
                 <a:cs typeface="Andale Mono"/>
               </a:rPr>
-              <a:t> </a:t>
-            </a:r>
-            <a:r>
-              <a:rPr lang="en-US" dirty="0" err="1" smtClean="0">
-                <a:latin typeface="Andale Mono"/>
-                <a:cs typeface="Andale Mono"/>
-              </a:rPr>
-              <a:t>anal</a:t>
-            </a:r>
-            <a:r>
-              <a:rPr lang="en-US" dirty="0" err="1" smtClean="0">
-                <a:latin typeface="Andale Mono"/>
-                <a:cs typeface="Andale Mono"/>
-              </a:rPr>
-              <a:t>ógica</a:t>
+              <a:t> e LED</a:t>
             </a:r>
             <a:endParaRPr lang="en-US" dirty="0">
               <a:latin typeface="Andale Mono"/>
@@ -5527,10 +7521,40 @@
           </a:p>
         </p:txBody>
       </p:sp>
+      <p:pic>
+        <p:nvPicPr>
+          <p:cNvPr id="3" name="Picture 2" descr="Botão e led.png"/>
+          <p:cNvPicPr>
+            <a:picLocks noChangeAspect="1"/>
+          </p:cNvPicPr>
+          <p:nvPr/>
+        </p:nvPicPr>
+        <p:blipFill>
+          <a:blip r:embed="rId2">
+            <a:extLst>
+              <a:ext uri="{28A0092B-C50C-407E-A947-70E740481C1C}">
+                <a14:useLocalDpi xmlns:a14="http://schemas.microsoft.com/office/drawing/2010/main" val="0"/>
+              </a:ext>
+            </a:extLst>
+          </a:blip>
+          <a:stretch>
+            <a:fillRect/>
+          </a:stretch>
+        </p:blipFill>
+        <p:spPr>
+          <a:xfrm>
+            <a:off x="0" y="1514265"/>
+            <a:ext cx="9144000" cy="4841436"/>
+          </a:xfrm>
+          <a:prstGeom prst="rect">
+            <a:avLst/>
+          </a:prstGeom>
+        </p:spPr>
+      </p:pic>
     </p:spTree>
     <p:extLst>
       <p:ext uri="{BB962C8B-B14F-4D97-AF65-F5344CB8AC3E}">
-        <p14:creationId xmlns:p14="http://schemas.microsoft.com/office/powerpoint/2010/main" val="3512566270"/>
+        <p14:creationId xmlns:p14="http://schemas.microsoft.com/office/powerpoint/2010/main" val="3564352374"/>
       </p:ext>
     </p:extLst>
   </p:cSld>

</xml_diff>